<commit_message>
Implemented delivery function pizza_bot.py
</commit_message>
<xml_diff>
--- a/Python.pptx
+++ b/Python.pptx
@@ -31,8 +31,8 @@
     <p:sldId id="282" r:id="rId22"/>
     <p:sldId id="281" r:id="rId23"/>
     <p:sldId id="285" r:id="rId24"/>
-    <p:sldId id="278" r:id="rId25"/>
-    <p:sldId id="284" r:id="rId26"/>
+    <p:sldId id="284" r:id="rId25"/>
+    <p:sldId id="278" r:id="rId26"/>
     <p:sldId id="283" r:id="rId27"/>
     <p:sldId id="280" r:id="rId28"/>
     <p:sldId id="261" r:id="rId29"/>
@@ -291,7 +291,7 @@
 <file path=ppt/revisionInfo.xml><?xml version="1.0" encoding="utf-8"?>
 <p1510:revInfo xmlns:a="http://schemas.openxmlformats.org/drawingml/2006/main" xmlns:r="http://schemas.openxmlformats.org/officeDocument/2006/relationships" xmlns:p1510="http://schemas.microsoft.com/office/powerpoint/2015/10/main">
   <p1510:revLst>
-    <p1510:client id="{268579DD-9F3E-DD42-ADBD-2C5BCBEBF3D0}" v="74" dt="2023-05-12T08:02:56.160"/>
+    <p1510:client id="{268579DD-9F3E-DD42-ADBD-2C5BCBEBF3D0}" v="79" dt="2023-05-12T08:15:47.599"/>
   </p1510:revLst>
 </p1510:revInfo>
 </file>
@@ -301,7 +301,7 @@
   <pc:docChgLst>
     <pc:chgData name="Kaitlin Eustaquio" userId="1db1b819-5a69-4e28-a1f3-107bdd323ba9" providerId="ADAL" clId="{268579DD-9F3E-DD42-ADBD-2C5BCBEBF3D0}"/>
     <pc:docChg chg="undo redo custSel addSld delSld modSld sldOrd">
-      <pc:chgData name="Kaitlin Eustaquio" userId="1db1b819-5a69-4e28-a1f3-107bdd323ba9" providerId="ADAL" clId="{268579DD-9F3E-DD42-ADBD-2C5BCBEBF3D0}" dt="2023-05-12T08:03:47.103" v="1702" actId="14734"/>
+      <pc:chgData name="Kaitlin Eustaquio" userId="1db1b819-5a69-4e28-a1f3-107bdd323ba9" providerId="ADAL" clId="{268579DD-9F3E-DD42-ADBD-2C5BCBEBF3D0}" dt="2023-05-12T08:25:08.315" v="1724" actId="20577"/>
       <pc:docMkLst>
         <pc:docMk/>
       </pc:docMkLst>
@@ -1263,12 +1263,60 @@
           <pc:sldMk cId="3342802139" sldId="283"/>
         </pc:sldMkLst>
       </pc:sldChg>
-      <pc:sldChg chg="add">
-        <pc:chgData name="Kaitlin Eustaquio" userId="1db1b819-5a69-4e28-a1f3-107bdd323ba9" providerId="ADAL" clId="{268579DD-9F3E-DD42-ADBD-2C5BCBEBF3D0}" dt="2023-05-12T08:00:10.417" v="1681" actId="2890"/>
+      <pc:sldChg chg="addSp delSp modSp add mod ord">
+        <pc:chgData name="Kaitlin Eustaquio" userId="1db1b819-5a69-4e28-a1f3-107bdd323ba9" providerId="ADAL" clId="{268579DD-9F3E-DD42-ADBD-2C5BCBEBF3D0}" dt="2023-05-12T08:25:08.315" v="1724" actId="20577"/>
         <pc:sldMkLst>
           <pc:docMk/>
           <pc:sldMk cId="974398969" sldId="284"/>
         </pc:sldMkLst>
+        <pc:spChg chg="mod">
+          <ac:chgData name="Kaitlin Eustaquio" userId="1db1b819-5a69-4e28-a1f3-107bdd323ba9" providerId="ADAL" clId="{268579DD-9F3E-DD42-ADBD-2C5BCBEBF3D0}" dt="2023-05-12T08:25:08.315" v="1724" actId="20577"/>
+          <ac:spMkLst>
+            <pc:docMk/>
+            <pc:sldMk cId="974398969" sldId="284"/>
+            <ac:spMk id="78" creationId="{00000000-0000-0000-0000-000000000000}"/>
+          </ac:spMkLst>
+        </pc:spChg>
+        <pc:graphicFrameChg chg="add del mod">
+          <ac:chgData name="Kaitlin Eustaquio" userId="1db1b819-5a69-4e28-a1f3-107bdd323ba9" providerId="ADAL" clId="{268579DD-9F3E-DD42-ADBD-2C5BCBEBF3D0}" dt="2023-05-12T08:15:44.306" v="1710"/>
+          <ac:graphicFrameMkLst>
+            <pc:docMk/>
+            <pc:sldMk cId="974398969" sldId="284"/>
+            <ac:graphicFrameMk id="4" creationId="{FAA4DD35-15F0-C1FB-9C17-2D0B2998ED58}"/>
+          </ac:graphicFrameMkLst>
+        </pc:graphicFrameChg>
+        <pc:graphicFrameChg chg="add mod">
+          <ac:chgData name="Kaitlin Eustaquio" userId="1db1b819-5a69-4e28-a1f3-107bdd323ba9" providerId="ADAL" clId="{268579DD-9F3E-DD42-ADBD-2C5BCBEBF3D0}" dt="2023-05-12T08:15:47.598" v="1712"/>
+          <ac:graphicFrameMkLst>
+            <pc:docMk/>
+            <pc:sldMk cId="974398969" sldId="284"/>
+            <ac:graphicFrameMk id="5" creationId="{6D075708-EECE-F282-82A1-7FF1ADD73AB2}"/>
+          </ac:graphicFrameMkLst>
+        </pc:graphicFrameChg>
+        <pc:graphicFrameChg chg="del">
+          <ac:chgData name="Kaitlin Eustaquio" userId="1db1b819-5a69-4e28-a1f3-107bdd323ba9" providerId="ADAL" clId="{268579DD-9F3E-DD42-ADBD-2C5BCBEBF3D0}" dt="2023-05-12T08:15:46.368" v="1711" actId="478"/>
+          <ac:graphicFrameMkLst>
+            <pc:docMk/>
+            <pc:sldMk cId="974398969" sldId="284"/>
+            <ac:graphicFrameMk id="79" creationId="{00000000-0000-0000-0000-000000000000}"/>
+          </ac:graphicFrameMkLst>
+        </pc:graphicFrameChg>
+        <pc:picChg chg="add mod">
+          <ac:chgData name="Kaitlin Eustaquio" userId="1db1b819-5a69-4e28-a1f3-107bdd323ba9" providerId="ADAL" clId="{268579DD-9F3E-DD42-ADBD-2C5BCBEBF3D0}" dt="2023-05-12T08:16:02.599" v="1719" actId="1076"/>
+          <ac:picMkLst>
+            <pc:docMk/>
+            <pc:sldMk cId="974398969" sldId="284"/>
+            <ac:picMk id="2" creationId="{571D5578-9C96-BB38-69FC-5D9410B6AA4D}"/>
+          </ac:picMkLst>
+        </pc:picChg>
+        <pc:picChg chg="add mod">
+          <ac:chgData name="Kaitlin Eustaquio" userId="1db1b819-5a69-4e28-a1f3-107bdd323ba9" providerId="ADAL" clId="{268579DD-9F3E-DD42-ADBD-2C5BCBEBF3D0}" dt="2023-05-12T08:15:57.909" v="1715" actId="1076"/>
+          <ac:picMkLst>
+            <pc:docMk/>
+            <pc:sldMk cId="974398969" sldId="284"/>
+            <ac:picMk id="3" creationId="{4DC98D71-EA0C-4341-66A9-017C7A06F4F8}"/>
+          </ac:picMkLst>
+        </pc:picChg>
       </pc:sldChg>
       <pc:sldChg chg="addSp delSp modSp add mod ord">
         <pc:chgData name="Kaitlin Eustaquio" userId="1db1b819-5a69-4e28-a1f3-107bdd323ba9" providerId="ADAL" clId="{268579DD-9F3E-DD42-ADBD-2C5BCBEBF3D0}" dt="2023-05-12T08:02:42.495" v="1686" actId="1076"/>
@@ -3576,7 +3624,7 @@
     </p:spTree>
     <p:extLst>
       <p:ext uri="{BB962C8B-B14F-4D97-AF65-F5344CB8AC3E}">
-        <p14:creationId xmlns:p14="http://schemas.microsoft.com/office/powerpoint/2010/main" val="3159739832"/>
+        <p14:creationId xmlns:p14="http://schemas.microsoft.com/office/powerpoint/2010/main" val="1193034252"/>
       </p:ext>
     </p:extLst>
   </p:cSld>
@@ -3685,7 +3733,7 @@
     </p:spTree>
     <p:extLst>
       <p:ext uri="{BB962C8B-B14F-4D97-AF65-F5344CB8AC3E}">
-        <p14:creationId xmlns:p14="http://schemas.microsoft.com/office/powerpoint/2010/main" val="1193034252"/>
+        <p14:creationId xmlns:p14="http://schemas.microsoft.com/office/powerpoint/2010/main" val="3159739832"/>
       </p:ext>
     </p:extLst>
   </p:cSld>
@@ -14481,6 +14529,419 @@
             </a:pPr>
             <a:r>
               <a:rPr lang="en" dirty="0"/>
+              <a:t>Component 4 v2 - Test Plan (and screenshot)</a:t>
+            </a:r>
+            <a:endParaRPr dirty="0"/>
+          </a:p>
+        </p:txBody>
+      </p:sp>
+      <p:pic>
+        <p:nvPicPr>
+          <p:cNvPr id="2" name="Picture 1">
+            <a:extLst>
+              <a:ext uri="{FF2B5EF4-FFF2-40B4-BE49-F238E27FC236}">
+                <a16:creationId xmlns:a16="http://schemas.microsoft.com/office/drawing/2014/main" id="{571D5578-9C96-BB38-69FC-5D9410B6AA4D}"/>
+              </a:ext>
+            </a:extLst>
+          </p:cNvPr>
+          <p:cNvPicPr>
+            <a:picLocks noChangeAspect="1"/>
+          </p:cNvPicPr>
+          <p:nvPr/>
+        </p:nvPicPr>
+        <p:blipFill>
+          <a:blip r:embed="rId3"/>
+          <a:stretch>
+            <a:fillRect/>
+          </a:stretch>
+        </p:blipFill>
+        <p:spPr>
+          <a:xfrm>
+            <a:off x="5696060" y="1017725"/>
+            <a:ext cx="1577198" cy="1708135"/>
+          </a:xfrm>
+          <a:prstGeom prst="rect">
+            <a:avLst/>
+          </a:prstGeom>
+        </p:spPr>
+      </p:pic>
+      <p:pic>
+        <p:nvPicPr>
+          <p:cNvPr id="3" name="Picture 2">
+            <a:extLst>
+              <a:ext uri="{FF2B5EF4-FFF2-40B4-BE49-F238E27FC236}">
+                <a16:creationId xmlns:a16="http://schemas.microsoft.com/office/drawing/2014/main" id="{4DC98D71-EA0C-4341-66A9-017C7A06F4F8}"/>
+              </a:ext>
+            </a:extLst>
+          </p:cNvPr>
+          <p:cNvPicPr>
+            <a:picLocks noChangeAspect="1"/>
+          </p:cNvPicPr>
+          <p:nvPr/>
+        </p:nvPicPr>
+        <p:blipFill>
+          <a:blip r:embed="rId4"/>
+          <a:stretch>
+            <a:fillRect/>
+          </a:stretch>
+        </p:blipFill>
+        <p:spPr>
+          <a:xfrm>
+            <a:off x="1369243" y="1074132"/>
+            <a:ext cx="995012" cy="1695628"/>
+          </a:xfrm>
+          <a:prstGeom prst="rect">
+            <a:avLst/>
+          </a:prstGeom>
+        </p:spPr>
+      </p:pic>
+      <p:graphicFrame>
+        <p:nvGraphicFramePr>
+          <p:cNvPr id="5" name="Google Shape;79;p17">
+            <a:extLst>
+              <a:ext uri="{FF2B5EF4-FFF2-40B4-BE49-F238E27FC236}">
+                <a16:creationId xmlns:a16="http://schemas.microsoft.com/office/drawing/2014/main" id="{6D075708-EECE-F282-82A1-7FF1ADD73AB2}"/>
+              </a:ext>
+            </a:extLst>
+          </p:cNvPr>
+          <p:cNvGraphicFramePr/>
+          <p:nvPr>
+            <p:extLst>
+              <p:ext uri="{D42A27DB-BD31-4B8C-83A1-F6EECF244321}">
+                <p14:modId xmlns:p14="http://schemas.microsoft.com/office/powerpoint/2010/main" val="3572504259"/>
+              </p:ext>
+            </p:extLst>
+          </p:nvPr>
+        </p:nvGraphicFramePr>
+        <p:xfrm>
+          <a:off x="311700" y="2857560"/>
+          <a:ext cx="8520600" cy="2285940"/>
+        </p:xfrm>
+        <a:graphic>
+          <a:graphicData uri="http://schemas.openxmlformats.org/drawingml/2006/table">
+            <a:tbl>
+              <a:tblPr>
+                <a:noFill/>
+                <a:tableStyleId>{E1099E06-0E6B-448D-9D27-60429F06E6F4}</a:tableStyleId>
+              </a:tblPr>
+              <a:tblGrid>
+                <a:gridCol w="3051702">
+                  <a:extLst>
+                    <a:ext uri="{9D8B030D-6E8A-4147-A177-3AD203B41FA5}">
+                      <a16:colId xmlns:a16="http://schemas.microsoft.com/office/drawing/2014/main" val="20000"/>
+                    </a:ext>
+                  </a:extLst>
+                </a:gridCol>
+                <a:gridCol w="5468898">
+                  <a:extLst>
+                    <a:ext uri="{9D8B030D-6E8A-4147-A177-3AD203B41FA5}">
+                      <a16:colId xmlns:a16="http://schemas.microsoft.com/office/drawing/2014/main" val="20001"/>
+                    </a:ext>
+                  </a:extLst>
+                </a:gridCol>
+              </a:tblGrid>
+              <a:tr h="381000">
+                <a:tc>
+                  <a:txBody>
+                    <a:bodyPr/>
+                    <a:lstStyle/>
+                    <a:p>
+                      <a:pPr marL="0" lvl="0" indent="0" algn="l" rtl="0">
+                        <a:spcBef>
+                          <a:spcPts val="0"/>
+                        </a:spcBef>
+                        <a:spcAft>
+                          <a:spcPts val="0"/>
+                        </a:spcAft>
+                        <a:buNone/>
+                      </a:pPr>
+                      <a:r>
+                        <a:rPr lang="en" sz="1800" b="1" dirty="0"/>
+                        <a:t>Test Case</a:t>
+                      </a:r>
+                      <a:endParaRPr sz="1800" b="1" dirty="0"/>
+                    </a:p>
+                  </a:txBody>
+                  <a:tcPr marL="91425" marR="91425" marT="91425" marB="91425">
+                    <a:solidFill>
+                      <a:srgbClr val="CCCCCC"/>
+                    </a:solidFill>
+                  </a:tcPr>
+                </a:tc>
+                <a:tc>
+                  <a:txBody>
+                    <a:bodyPr/>
+                    <a:lstStyle/>
+                    <a:p>
+                      <a:pPr marL="0" lvl="0" indent="0" algn="l" rtl="0">
+                        <a:spcBef>
+                          <a:spcPts val="0"/>
+                        </a:spcBef>
+                        <a:spcAft>
+                          <a:spcPts val="0"/>
+                        </a:spcAft>
+                        <a:buNone/>
+                      </a:pPr>
+                      <a:r>
+                        <a:rPr lang="en" sz="1800" b="1" dirty="0"/>
+                        <a:t>Expected Values</a:t>
+                      </a:r>
+                      <a:endParaRPr sz="1800" b="1" dirty="0"/>
+                    </a:p>
+                  </a:txBody>
+                  <a:tcPr marL="91425" marR="91425" marT="91425" marB="91425">
+                    <a:solidFill>
+                      <a:srgbClr val="CCCCCC"/>
+                    </a:solidFill>
+                  </a:tcPr>
+                </a:tc>
+                <a:extLst>
+                  <a:ext uri="{0D108BD9-81ED-4DB2-BD59-A6C34878D82A}">
+                    <a16:rowId xmlns:a16="http://schemas.microsoft.com/office/drawing/2014/main" val="10000"/>
+                  </a:ext>
+                </a:extLst>
+              </a:tr>
+              <a:tr h="396200">
+                <a:tc>
+                  <a:txBody>
+                    <a:bodyPr/>
+                    <a:lstStyle/>
+                    <a:p>
+                      <a:pPr marL="0" marR="0" lvl="0" indent="0" algn="l" defTabSz="914400" rtl="0" eaLnBrk="1" fontAlgn="auto" latinLnBrk="0" hangingPunct="1">
+                        <a:lnSpc>
+                          <a:spcPct val="100000"/>
+                        </a:lnSpc>
+                        <a:spcBef>
+                          <a:spcPts val="0"/>
+                        </a:spcBef>
+                        <a:spcAft>
+                          <a:spcPts val="0"/>
+                        </a:spcAft>
+                        <a:buClr>
+                          <a:srgbClr val="000000"/>
+                        </a:buClr>
+                        <a:buSzTx/>
+                        <a:buFont typeface="Arial"/>
+                        <a:buNone/>
+                        <a:tabLst/>
+                        <a:defRPr/>
+                      </a:pPr>
+                      <a:r>
+                        <a:rPr lang="en-US" sz="1800" dirty="0"/>
+                        <a:t>Input name</a:t>
+                      </a:r>
+                    </a:p>
+                    <a:p>
+                      <a:pPr marL="0" lvl="0" indent="0" algn="l" rtl="0">
+                        <a:spcBef>
+                          <a:spcPts val="0"/>
+                        </a:spcBef>
+                        <a:spcAft>
+                          <a:spcPts val="0"/>
+                        </a:spcAft>
+                        <a:buNone/>
+                      </a:pPr>
+                      <a:r>
+                        <a:rPr lang="en-US" sz="1800" dirty="0"/>
+                        <a:t>Input number</a:t>
+                      </a:r>
+                    </a:p>
+                    <a:p>
+                      <a:pPr marL="0" lvl="0" indent="0" algn="l" rtl="0">
+                        <a:spcBef>
+                          <a:spcPts val="0"/>
+                        </a:spcBef>
+                        <a:spcAft>
+                          <a:spcPts val="0"/>
+                        </a:spcAft>
+                        <a:buNone/>
+                      </a:pPr>
+                      <a:r>
+                        <a:rPr lang="en-US" sz="1800" dirty="0"/>
+                        <a:t>Input address (house number, street name, suburb)</a:t>
+                      </a:r>
+                    </a:p>
+                    <a:p>
+                      <a:pPr marL="0" lvl="0" indent="0" algn="l" rtl="0">
+                        <a:spcBef>
+                          <a:spcPts val="0"/>
+                        </a:spcBef>
+                        <a:spcAft>
+                          <a:spcPts val="0"/>
+                        </a:spcAft>
+                        <a:buNone/>
+                      </a:pPr>
+                      <a:r>
+                        <a:rPr lang="en-US" sz="1800" dirty="0"/>
+                        <a:t>Left input blank</a:t>
+                      </a:r>
+                    </a:p>
+                  </a:txBody>
+                  <a:tcPr marL="91425" marR="91425" marT="91425" marB="91425"/>
+                </a:tc>
+                <a:tc>
+                  <a:txBody>
+                    <a:bodyPr/>
+                    <a:lstStyle/>
+                    <a:p>
+                      <a:pPr marL="0" lvl="0" indent="0" algn="l" rtl="0">
+                        <a:spcBef>
+                          <a:spcPts val="0"/>
+                        </a:spcBef>
+                        <a:spcAft>
+                          <a:spcPts val="0"/>
+                        </a:spcAft>
+                        <a:buNone/>
+                      </a:pPr>
+                      <a:r>
+                        <a:rPr lang="en-US" sz="1800" dirty="0"/>
+                        <a:t>Printed correctly, can input both integers and letters</a:t>
+                      </a:r>
+                    </a:p>
+                    <a:p>
+                      <a:pPr marL="0" marR="0" lvl="0" indent="0" algn="l" defTabSz="914400" rtl="0" eaLnBrk="1" fontAlgn="auto" latinLnBrk="0" hangingPunct="1">
+                        <a:lnSpc>
+                          <a:spcPct val="100000"/>
+                        </a:lnSpc>
+                        <a:spcBef>
+                          <a:spcPts val="0"/>
+                        </a:spcBef>
+                        <a:spcAft>
+                          <a:spcPts val="0"/>
+                        </a:spcAft>
+                        <a:buClr>
+                          <a:srgbClr val="000000"/>
+                        </a:buClr>
+                        <a:buSzTx/>
+                        <a:buFont typeface="Arial"/>
+                        <a:buNone/>
+                        <a:tabLst/>
+                        <a:defRPr/>
+                      </a:pPr>
+                      <a:r>
+                        <a:rPr lang="en-US" sz="1800" dirty="0"/>
+                        <a:t>Printed correctly, can input both integers and letters</a:t>
+                      </a:r>
+                    </a:p>
+                    <a:p>
+                      <a:pPr marL="0" marR="0" lvl="0" indent="0" algn="l" defTabSz="914400" rtl="0" eaLnBrk="1" fontAlgn="auto" latinLnBrk="0" hangingPunct="1">
+                        <a:lnSpc>
+                          <a:spcPct val="100000"/>
+                        </a:lnSpc>
+                        <a:spcBef>
+                          <a:spcPts val="0"/>
+                        </a:spcBef>
+                        <a:spcAft>
+                          <a:spcPts val="0"/>
+                        </a:spcAft>
+                        <a:buClr>
+                          <a:srgbClr val="000000"/>
+                        </a:buClr>
+                        <a:buSzTx/>
+                        <a:buFont typeface="Arial"/>
+                        <a:buNone/>
+                        <a:tabLst/>
+                        <a:defRPr/>
+                      </a:pPr>
+                      <a:r>
+                        <a:rPr lang="en-US" sz="1800" dirty="0"/>
+                        <a:t>Printed correctly, can input both integers and letters</a:t>
+                      </a:r>
+                    </a:p>
+                    <a:p>
+                      <a:pPr marL="0" lvl="0" indent="0" algn="l" rtl="0">
+                        <a:spcBef>
+                          <a:spcPts val="0"/>
+                        </a:spcBef>
+                        <a:spcAft>
+                          <a:spcPts val="0"/>
+                        </a:spcAft>
+                        <a:buNone/>
+                      </a:pPr>
+                      <a:r>
+                        <a:rPr lang="en-US" sz="1800" dirty="0"/>
+                        <a:t>Prints error message and asks for input again</a:t>
+                      </a:r>
+                    </a:p>
+                  </a:txBody>
+                  <a:tcPr marL="91425" marR="91425" marT="91425" marB="91425"/>
+                </a:tc>
+                <a:extLst>
+                  <a:ext uri="{0D108BD9-81ED-4DB2-BD59-A6C34878D82A}">
+                    <a16:rowId xmlns:a16="http://schemas.microsoft.com/office/drawing/2014/main" val="10001"/>
+                  </a:ext>
+                </a:extLst>
+              </a:tr>
+            </a:tbl>
+          </a:graphicData>
+        </a:graphic>
+      </p:graphicFrame>
+    </p:spTree>
+    <p:extLst>
+      <p:ext uri="{BB962C8B-B14F-4D97-AF65-F5344CB8AC3E}">
+        <p14:creationId xmlns:p14="http://schemas.microsoft.com/office/powerpoint/2010/main" val="974398969"/>
+      </p:ext>
+    </p:extLst>
+  </p:cSld>
+  <p:clrMapOvr>
+    <a:masterClrMapping/>
+  </p:clrMapOvr>
+</p:sld>
+</file>
+
+<file path=ppt/slides/slide25.xml><?xml version="1.0" encoding="utf-8"?>
+<p:sld xmlns:a="http://schemas.openxmlformats.org/drawingml/2006/main" xmlns:r="http://schemas.openxmlformats.org/officeDocument/2006/relationships" xmlns:p="http://schemas.openxmlformats.org/presentationml/2006/main">
+  <p:cSld>
+    <p:spTree>
+      <p:nvGrpSpPr>
+        <p:cNvPr id="1" name="Shape 77"/>
+        <p:cNvGrpSpPr/>
+        <p:nvPr/>
+      </p:nvGrpSpPr>
+      <p:grpSpPr>
+        <a:xfrm>
+          <a:off x="0" y="0"/>
+          <a:ext cx="0" cy="0"/>
+          <a:chOff x="0" y="0"/>
+          <a:chExt cx="0" cy="0"/>
+        </a:xfrm>
+      </p:grpSpPr>
+      <p:sp>
+        <p:nvSpPr>
+          <p:cNvPr id="78" name="Google Shape;78;p17"/>
+          <p:cNvSpPr txBox="1">
+            <a:spLocks noGrp="1"/>
+          </p:cNvSpPr>
+          <p:nvPr>
+            <p:ph type="title"/>
+          </p:nvPr>
+        </p:nvSpPr>
+        <p:spPr>
+          <a:xfrm>
+            <a:off x="311700" y="445025"/>
+            <a:ext cx="8520600" cy="572700"/>
+          </a:xfrm>
+          <a:prstGeom prst="rect">
+            <a:avLst/>
+          </a:prstGeom>
+        </p:spPr>
+        <p:txBody>
+          <a:bodyPr spcFirstLastPara="1" wrap="square" lIns="91425" tIns="91425" rIns="91425" bIns="91425" anchor="t" anchorCtr="0">
+            <a:noAutofit/>
+          </a:bodyPr>
+          <a:lstStyle/>
+          <a:p>
+            <a:pPr marL="0" lvl="0" indent="0" algn="l" rtl="0">
+              <a:spcBef>
+                <a:spcPts val="0"/>
+              </a:spcBef>
+              <a:spcAft>
+                <a:spcPts val="0"/>
+              </a:spcAft>
+              <a:buNone/>
+            </a:pPr>
+            <a:r>
+              <a:rPr lang="en" dirty="0"/>
               <a:t>Component  v - Test Plan (and screenshot)</a:t>
             </a:r>
             <a:endParaRPr dirty="0"/>
@@ -14766,243 +15227,6 @@
     <p:extLst>
       <p:ext uri="{BB962C8B-B14F-4D97-AF65-F5344CB8AC3E}">
         <p14:creationId xmlns:p14="http://schemas.microsoft.com/office/powerpoint/2010/main" val="2084576816"/>
-      </p:ext>
-    </p:extLst>
-  </p:cSld>
-  <p:clrMapOvr>
-    <a:masterClrMapping/>
-  </p:clrMapOvr>
-</p:sld>
-</file>
-
-<file path=ppt/slides/slide25.xml><?xml version="1.0" encoding="utf-8"?>
-<p:sld xmlns:a="http://schemas.openxmlformats.org/drawingml/2006/main" xmlns:r="http://schemas.openxmlformats.org/officeDocument/2006/relationships" xmlns:p="http://schemas.openxmlformats.org/presentationml/2006/main">
-  <p:cSld>
-    <p:spTree>
-      <p:nvGrpSpPr>
-        <p:cNvPr id="1" name="Shape 77"/>
-        <p:cNvGrpSpPr/>
-        <p:nvPr/>
-      </p:nvGrpSpPr>
-      <p:grpSpPr>
-        <a:xfrm>
-          <a:off x="0" y="0"/>
-          <a:ext cx="0" cy="0"/>
-          <a:chOff x="0" y="0"/>
-          <a:chExt cx="0" cy="0"/>
-        </a:xfrm>
-      </p:grpSpPr>
-      <p:sp>
-        <p:nvSpPr>
-          <p:cNvPr id="78" name="Google Shape;78;p17"/>
-          <p:cNvSpPr txBox="1">
-            <a:spLocks noGrp="1"/>
-          </p:cNvSpPr>
-          <p:nvPr>
-            <p:ph type="title"/>
-          </p:nvPr>
-        </p:nvSpPr>
-        <p:spPr>
-          <a:xfrm>
-            <a:off x="311700" y="445025"/>
-            <a:ext cx="8520600" cy="572700"/>
-          </a:xfrm>
-          <a:prstGeom prst="rect">
-            <a:avLst/>
-          </a:prstGeom>
-        </p:spPr>
-        <p:txBody>
-          <a:bodyPr spcFirstLastPara="1" wrap="square" lIns="91425" tIns="91425" rIns="91425" bIns="91425" anchor="t" anchorCtr="0">
-            <a:noAutofit/>
-          </a:bodyPr>
-          <a:lstStyle/>
-          <a:p>
-            <a:pPr marL="0" lvl="0" indent="0" algn="l" rtl="0">
-              <a:spcBef>
-                <a:spcPts val="0"/>
-              </a:spcBef>
-              <a:spcAft>
-                <a:spcPts val="0"/>
-              </a:spcAft>
-              <a:buNone/>
-            </a:pPr>
-            <a:r>
-              <a:rPr lang="en" dirty="0"/>
-              <a:t>Component  v - Test Plan (and screenshot)</a:t>
-            </a:r>
-            <a:endParaRPr dirty="0"/>
-          </a:p>
-        </p:txBody>
-      </p:sp>
-      <p:graphicFrame>
-        <p:nvGraphicFramePr>
-          <p:cNvPr id="79" name="Google Shape;79;p17"/>
-          <p:cNvGraphicFramePr/>
-          <p:nvPr/>
-        </p:nvGraphicFramePr>
-        <p:xfrm>
-          <a:off x="311700" y="3794967"/>
-          <a:ext cx="8520600" cy="1188660"/>
-        </p:xfrm>
-        <a:graphic>
-          <a:graphicData uri="http://schemas.openxmlformats.org/drawingml/2006/table">
-            <a:tbl>
-              <a:tblPr>
-                <a:noFill/>
-                <a:tableStyleId>{E1099E06-0E6B-448D-9D27-60429F06E6F4}</a:tableStyleId>
-              </a:tblPr>
-              <a:tblGrid>
-                <a:gridCol w="2709796">
-                  <a:extLst>
-                    <a:ext uri="{9D8B030D-6E8A-4147-A177-3AD203B41FA5}">
-                      <a16:colId xmlns:a16="http://schemas.microsoft.com/office/drawing/2014/main" val="20000"/>
-                    </a:ext>
-                  </a:extLst>
-                </a:gridCol>
-                <a:gridCol w="5810804">
-                  <a:extLst>
-                    <a:ext uri="{9D8B030D-6E8A-4147-A177-3AD203B41FA5}">
-                      <a16:colId xmlns:a16="http://schemas.microsoft.com/office/drawing/2014/main" val="20001"/>
-                    </a:ext>
-                  </a:extLst>
-                </a:gridCol>
-              </a:tblGrid>
-              <a:tr h="381000">
-                <a:tc>
-                  <a:txBody>
-                    <a:bodyPr/>
-                    <a:lstStyle/>
-                    <a:p>
-                      <a:pPr marL="0" lvl="0" indent="0" algn="l" rtl="0">
-                        <a:spcBef>
-                          <a:spcPts val="0"/>
-                        </a:spcBef>
-                        <a:spcAft>
-                          <a:spcPts val="0"/>
-                        </a:spcAft>
-                        <a:buNone/>
-                      </a:pPr>
-                      <a:r>
-                        <a:rPr lang="en" sz="1800" b="1" dirty="0"/>
-                        <a:t>Test Case</a:t>
-                      </a:r>
-                      <a:endParaRPr sz="1800" b="1" dirty="0"/>
-                    </a:p>
-                  </a:txBody>
-                  <a:tcPr marL="91425" marR="91425" marT="91425" marB="91425">
-                    <a:solidFill>
-                      <a:srgbClr val="CCCCCC"/>
-                    </a:solidFill>
-                  </a:tcPr>
-                </a:tc>
-                <a:tc>
-                  <a:txBody>
-                    <a:bodyPr/>
-                    <a:lstStyle/>
-                    <a:p>
-                      <a:pPr marL="0" lvl="0" indent="0" algn="l" rtl="0">
-                        <a:spcBef>
-                          <a:spcPts val="0"/>
-                        </a:spcBef>
-                        <a:spcAft>
-                          <a:spcPts val="0"/>
-                        </a:spcAft>
-                        <a:buNone/>
-                      </a:pPr>
-                      <a:r>
-                        <a:rPr lang="en" sz="1800" b="1" dirty="0"/>
-                        <a:t>Expected Values</a:t>
-                      </a:r>
-                      <a:endParaRPr sz="1800" b="1" dirty="0"/>
-                    </a:p>
-                  </a:txBody>
-                  <a:tcPr marL="91425" marR="91425" marT="91425" marB="91425">
-                    <a:solidFill>
-                      <a:srgbClr val="CCCCCC"/>
-                    </a:solidFill>
-                  </a:tcPr>
-                </a:tc>
-                <a:extLst>
-                  <a:ext uri="{0D108BD9-81ED-4DB2-BD59-A6C34878D82A}">
-                    <a16:rowId xmlns:a16="http://schemas.microsoft.com/office/drawing/2014/main" val="10000"/>
-                  </a:ext>
-                </a:extLst>
-              </a:tr>
-              <a:tr h="396200">
-                <a:tc>
-                  <a:txBody>
-                    <a:bodyPr/>
-                    <a:lstStyle/>
-                    <a:p>
-                      <a:pPr marL="0" marR="0" lvl="0" indent="0" algn="l" defTabSz="914400" rtl="0" eaLnBrk="1" fontAlgn="auto" latinLnBrk="0" hangingPunct="1">
-                        <a:lnSpc>
-                          <a:spcPct val="100000"/>
-                        </a:lnSpc>
-                        <a:spcBef>
-                          <a:spcPts val="0"/>
-                        </a:spcBef>
-                        <a:spcAft>
-                          <a:spcPts val="0"/>
-                        </a:spcAft>
-                        <a:buClr>
-                          <a:srgbClr val="000000"/>
-                        </a:buClr>
-                        <a:buSzTx/>
-                        <a:buFont typeface="Arial"/>
-                        <a:buNone/>
-                        <a:tabLst/>
-                        <a:defRPr/>
-                      </a:pPr>
-                      <a:endParaRPr lang="en-US" sz="1800" dirty="0"/>
-                    </a:p>
-                    <a:p>
-                      <a:pPr marL="0" lvl="0" indent="0" algn="l" rtl="0">
-                        <a:spcBef>
-                          <a:spcPts val="0"/>
-                        </a:spcBef>
-                        <a:spcAft>
-                          <a:spcPts val="0"/>
-                        </a:spcAft>
-                        <a:buNone/>
-                      </a:pPr>
-                      <a:endParaRPr sz="1800" dirty="0"/>
-                    </a:p>
-                  </a:txBody>
-                  <a:tcPr marL="91425" marR="91425" marT="91425" marB="91425"/>
-                </a:tc>
-                <a:tc>
-                  <a:txBody>
-                    <a:bodyPr/>
-                    <a:lstStyle/>
-                    <a:p>
-                      <a:pPr marL="0" lvl="0" indent="0" algn="l" rtl="0">
-                        <a:spcBef>
-                          <a:spcPts val="0"/>
-                        </a:spcBef>
-                        <a:spcAft>
-                          <a:spcPts val="0"/>
-                        </a:spcAft>
-                        <a:buNone/>
-                      </a:pPr>
-                      <a:endParaRPr sz="1800" dirty="0"/>
-                    </a:p>
-                  </a:txBody>
-                  <a:tcPr marL="91425" marR="91425" marT="91425" marB="91425"/>
-                </a:tc>
-                <a:extLst>
-                  <a:ext uri="{0D108BD9-81ED-4DB2-BD59-A6C34878D82A}">
-                    <a16:rowId xmlns:a16="http://schemas.microsoft.com/office/drawing/2014/main" val="10001"/>
-                  </a:ext>
-                </a:extLst>
-              </a:tr>
-            </a:tbl>
-          </a:graphicData>
-        </a:graphic>
-      </p:graphicFrame>
-    </p:spTree>
-    <p:extLst>
-      <p:ext uri="{BB962C8B-B14F-4D97-AF65-F5344CB8AC3E}">
-        <p14:creationId xmlns:p14="http://schemas.microsoft.com/office/powerpoint/2010/main" val="974398969"/>
       </p:ext>
     </p:extLst>
   </p:cSld>

</xml_diff>

<commit_message>
Added validation to num_pizzas
Added validation to num_pizzas entry to restrict num to between 1-5 and only accepts a valid integer
</commit_message>
<xml_diff>
--- a/Python.pptx
+++ b/Python.pptx
@@ -5,7 +5,7 @@
     <p:sldMasterId id="2147483659" r:id="rId1"/>
   </p:sldMasterIdLst>
   <p:notesMasterIdLst>
-    <p:notesMasterId r:id="rId37"/>
+    <p:notesMasterId r:id="rId42"/>
   </p:notesMasterIdLst>
   <p:sldIdLst>
     <p:sldId id="256" r:id="rId2"/>
@@ -40,9 +40,14 @@
     <p:sldId id="280" r:id="rId31"/>
     <p:sldId id="291" r:id="rId32"/>
     <p:sldId id="287" r:id="rId33"/>
-    <p:sldId id="288" r:id="rId34"/>
-    <p:sldId id="261" r:id="rId35"/>
-    <p:sldId id="262" r:id="rId36"/>
+    <p:sldId id="292" r:id="rId34"/>
+    <p:sldId id="288" r:id="rId35"/>
+    <p:sldId id="296" r:id="rId36"/>
+    <p:sldId id="295" r:id="rId37"/>
+    <p:sldId id="294" r:id="rId38"/>
+    <p:sldId id="293" r:id="rId39"/>
+    <p:sldId id="261" r:id="rId40"/>
+    <p:sldId id="262" r:id="rId41"/>
   </p:sldIdLst>
   <p:sldSz cx="9144000" cy="5143500" type="screen16x9"/>
   <p:notesSz cx="6858000" cy="9144000"/>
@@ -297,7 +302,7 @@
 <file path=ppt/revisionInfo.xml><?xml version="1.0" encoding="utf-8"?>
 <p1510:revInfo xmlns:a="http://schemas.openxmlformats.org/drawingml/2006/main" xmlns:r="http://schemas.openxmlformats.org/officeDocument/2006/relationships" xmlns:p1510="http://schemas.microsoft.com/office/powerpoint/2015/10/main">
   <p1510:revLst>
-    <p1510:client id="{268579DD-9F3E-DD42-ADBD-2C5BCBEBF3D0}" v="95" dt="2023-05-14T21:35:00.656"/>
+    <p1510:client id="{268579DD-9F3E-DD42-ADBD-2C5BCBEBF3D0}" v="99" dt="2023-05-16T02:51:24.354"/>
   </p1510:revLst>
 </p1510:revInfo>
 </file>
@@ -307,7 +312,7 @@
   <pc:docChgLst>
     <pc:chgData name="Kaitlin Eustaquio" userId="1db1b819-5a69-4e28-a1f3-107bdd323ba9" providerId="ADAL" clId="{268579DD-9F3E-DD42-ADBD-2C5BCBEBF3D0}"/>
     <pc:docChg chg="undo redo custSel addSld delSld modSld sldOrd">
-      <pc:chgData name="Kaitlin Eustaquio" userId="1db1b819-5a69-4e28-a1f3-107bdd323ba9" providerId="ADAL" clId="{268579DD-9F3E-DD42-ADBD-2C5BCBEBF3D0}" dt="2023-05-14T21:39:36.218" v="2107" actId="20577"/>
+      <pc:chgData name="Kaitlin Eustaquio" userId="1db1b819-5a69-4e28-a1f3-107bdd323ba9" providerId="ADAL" clId="{268579DD-9F3E-DD42-ADBD-2C5BCBEBF3D0}" dt="2023-05-16T02:52:18.608" v="2432" actId="20577"/>
       <pc:docMkLst>
         <pc:docMk/>
       </pc:docMkLst>
@@ -1597,6 +1602,81 @@
           </ac:picMkLst>
         </pc:picChg>
       </pc:sldChg>
+      <pc:sldChg chg="addSp delSp modSp add mod ord">
+        <pc:chgData name="Kaitlin Eustaquio" userId="1db1b819-5a69-4e28-a1f3-107bdd323ba9" providerId="ADAL" clId="{268579DD-9F3E-DD42-ADBD-2C5BCBEBF3D0}" dt="2023-05-16T02:30:09.880" v="2114" actId="1076"/>
+        <pc:sldMkLst>
+          <pc:docMk/>
+          <pc:sldMk cId="1440993590" sldId="292"/>
+        </pc:sldMkLst>
+        <pc:picChg chg="del">
+          <ac:chgData name="Kaitlin Eustaquio" userId="1db1b819-5a69-4e28-a1f3-107bdd323ba9" providerId="ADAL" clId="{268579DD-9F3E-DD42-ADBD-2C5BCBEBF3D0}" dt="2023-05-16T02:30:05.384" v="2110" actId="478"/>
+          <ac:picMkLst>
+            <pc:docMk/>
+            <pc:sldMk cId="1440993590" sldId="292"/>
+            <ac:picMk id="2" creationId="{24692111-2576-0306-C59B-5AA681C43897}"/>
+          </ac:picMkLst>
+        </pc:picChg>
+        <pc:picChg chg="add mod">
+          <ac:chgData name="Kaitlin Eustaquio" userId="1db1b819-5a69-4e28-a1f3-107bdd323ba9" providerId="ADAL" clId="{268579DD-9F3E-DD42-ADBD-2C5BCBEBF3D0}" dt="2023-05-16T02:30:09.880" v="2114" actId="1076"/>
+          <ac:picMkLst>
+            <pc:docMk/>
+            <pc:sldMk cId="1440993590" sldId="292"/>
+            <ac:picMk id="3" creationId="{C97ED042-3250-119B-D71A-D56AD12CC0C9}"/>
+          </ac:picMkLst>
+        </pc:picChg>
+      </pc:sldChg>
+      <pc:sldChg chg="add">
+        <pc:chgData name="Kaitlin Eustaquio" userId="1db1b819-5a69-4e28-a1f3-107bdd323ba9" providerId="ADAL" clId="{268579DD-9F3E-DD42-ADBD-2C5BCBEBF3D0}" dt="2023-05-16T02:30:12.385" v="2115" actId="2890"/>
+        <pc:sldMkLst>
+          <pc:docMk/>
+          <pc:sldMk cId="3398702849" sldId="293"/>
+        </pc:sldMkLst>
+      </pc:sldChg>
+      <pc:sldChg chg="add">
+        <pc:chgData name="Kaitlin Eustaquio" userId="1db1b819-5a69-4e28-a1f3-107bdd323ba9" providerId="ADAL" clId="{268579DD-9F3E-DD42-ADBD-2C5BCBEBF3D0}" dt="2023-05-16T02:30:14.126" v="2116" actId="2890"/>
+        <pc:sldMkLst>
+          <pc:docMk/>
+          <pc:sldMk cId="1700163231" sldId="294"/>
+        </pc:sldMkLst>
+      </pc:sldChg>
+      <pc:sldChg chg="add">
+        <pc:chgData name="Kaitlin Eustaquio" userId="1db1b819-5a69-4e28-a1f3-107bdd323ba9" providerId="ADAL" clId="{268579DD-9F3E-DD42-ADBD-2C5BCBEBF3D0}" dt="2023-05-16T02:30:40.172" v="2117" actId="2890"/>
+        <pc:sldMkLst>
+          <pc:docMk/>
+          <pc:sldMk cId="2337919152" sldId="295"/>
+        </pc:sldMkLst>
+      </pc:sldChg>
+      <pc:sldChg chg="addSp modSp add mod">
+        <pc:chgData name="Kaitlin Eustaquio" userId="1db1b819-5a69-4e28-a1f3-107bdd323ba9" providerId="ADAL" clId="{268579DD-9F3E-DD42-ADBD-2C5BCBEBF3D0}" dt="2023-05-16T02:52:18.608" v="2432" actId="20577"/>
+        <pc:sldMkLst>
+          <pc:docMk/>
+          <pc:sldMk cId="839176086" sldId="296"/>
+        </pc:sldMkLst>
+        <pc:graphicFrameChg chg="mod modGraphic">
+          <ac:chgData name="Kaitlin Eustaquio" userId="1db1b819-5a69-4e28-a1f3-107bdd323ba9" providerId="ADAL" clId="{268579DD-9F3E-DD42-ADBD-2C5BCBEBF3D0}" dt="2023-05-16T02:52:18.608" v="2432" actId="20577"/>
+          <ac:graphicFrameMkLst>
+            <pc:docMk/>
+            <pc:sldMk cId="839176086" sldId="296"/>
+            <ac:graphicFrameMk id="79" creationId="{00000000-0000-0000-0000-000000000000}"/>
+          </ac:graphicFrameMkLst>
+        </pc:graphicFrameChg>
+        <pc:picChg chg="add mod">
+          <ac:chgData name="Kaitlin Eustaquio" userId="1db1b819-5a69-4e28-a1f3-107bdd323ba9" providerId="ADAL" clId="{268579DD-9F3E-DD42-ADBD-2C5BCBEBF3D0}" dt="2023-05-16T02:46:55.584" v="2121" actId="1076"/>
+          <ac:picMkLst>
+            <pc:docMk/>
+            <pc:sldMk cId="839176086" sldId="296"/>
+            <ac:picMk id="2" creationId="{70C9E6F6-3762-3950-6471-9B63E843D96F}"/>
+          </ac:picMkLst>
+        </pc:picChg>
+        <pc:picChg chg="add mod">
+          <ac:chgData name="Kaitlin Eustaquio" userId="1db1b819-5a69-4e28-a1f3-107bdd323ba9" providerId="ADAL" clId="{268579DD-9F3E-DD42-ADBD-2C5BCBEBF3D0}" dt="2023-05-16T02:48:06.990" v="2124" actId="1076"/>
+          <ac:picMkLst>
+            <pc:docMk/>
+            <pc:sldMk cId="839176086" sldId="296"/>
+            <ac:picMk id="3" creationId="{0CD4E232-D441-1E34-6100-A444C96D1F3A}"/>
+          </ac:picMkLst>
+        </pc:picChg>
+      </pc:sldChg>
     </pc:docChg>
   </pc:docChgLst>
 </pc:chgInfo>
@@ -4892,6 +4972,115 @@
   <p:cSld>
     <p:spTree>
       <p:nvGrpSpPr>
+        <p:cNvPr id="1" name="Shape 69"/>
+        <p:cNvGrpSpPr/>
+        <p:nvPr/>
+      </p:nvGrpSpPr>
+      <p:grpSpPr>
+        <a:xfrm>
+          <a:off x="0" y="0"/>
+          <a:ext cx="0" cy="0"/>
+          <a:chOff x="0" y="0"/>
+          <a:chExt cx="0" cy="0"/>
+        </a:xfrm>
+      </p:grpSpPr>
+      <p:sp>
+        <p:nvSpPr>
+          <p:cNvPr id="70" name="Google Shape;70;gac10fef634_0_16:notes"/>
+          <p:cNvSpPr>
+            <a:spLocks noGrp="1" noRot="1" noChangeAspect="1"/>
+          </p:cNvSpPr>
+          <p:nvPr>
+            <p:ph type="sldImg" idx="2"/>
+          </p:nvPr>
+        </p:nvSpPr>
+        <p:spPr>
+          <a:xfrm>
+            <a:off x="381000" y="685800"/>
+            <a:ext cx="6096000" cy="3429000"/>
+          </a:xfrm>
+          <a:custGeom>
+            <a:avLst/>
+            <a:gdLst/>
+            <a:ahLst/>
+            <a:cxnLst/>
+            <a:rect l="l" t="t" r="r" b="b"/>
+            <a:pathLst>
+              <a:path w="120000" h="120000" extrusionOk="0">
+                <a:moveTo>
+                  <a:pt x="0" y="0"/>
+                </a:moveTo>
+                <a:lnTo>
+                  <a:pt x="120000" y="0"/>
+                </a:lnTo>
+                <a:lnTo>
+                  <a:pt x="120000" y="120000"/>
+                </a:lnTo>
+                <a:lnTo>
+                  <a:pt x="0" y="120000"/>
+                </a:lnTo>
+                <a:close/>
+              </a:path>
+            </a:pathLst>
+          </a:custGeom>
+        </p:spPr>
+      </p:sp>
+      <p:sp>
+        <p:nvSpPr>
+          <p:cNvPr id="71" name="Google Shape;71;gac10fef634_0_16:notes"/>
+          <p:cNvSpPr txBox="1">
+            <a:spLocks noGrp="1"/>
+          </p:cNvSpPr>
+          <p:nvPr>
+            <p:ph type="body" idx="1"/>
+          </p:nvPr>
+        </p:nvSpPr>
+        <p:spPr>
+          <a:xfrm>
+            <a:off x="685800" y="4343400"/>
+            <a:ext cx="5486400" cy="4114800"/>
+          </a:xfrm>
+          <a:prstGeom prst="rect">
+            <a:avLst/>
+          </a:prstGeom>
+        </p:spPr>
+        <p:txBody>
+          <a:bodyPr spcFirstLastPara="1" wrap="square" lIns="91425" tIns="91425" rIns="91425" bIns="91425" anchor="t" anchorCtr="0">
+            <a:noAutofit/>
+          </a:bodyPr>
+          <a:lstStyle/>
+          <a:p>
+            <a:pPr marL="0" lvl="0" indent="0" algn="l" rtl="0">
+              <a:spcBef>
+                <a:spcPts val="0"/>
+              </a:spcBef>
+              <a:spcAft>
+                <a:spcPts val="0"/>
+              </a:spcAft>
+              <a:buNone/>
+            </a:pPr>
+            <a:endParaRPr/>
+          </a:p>
+        </p:txBody>
+      </p:sp>
+    </p:spTree>
+    <p:extLst>
+      <p:ext uri="{BB962C8B-B14F-4D97-AF65-F5344CB8AC3E}">
+        <p14:creationId xmlns:p14="http://schemas.microsoft.com/office/powerpoint/2010/main" val="1999037407"/>
+      </p:ext>
+    </p:extLst>
+  </p:cSld>
+  <p:clrMapOvr>
+    <a:masterClrMapping/>
+  </p:clrMapOvr>
+</p:notes>
+</file>
+
+<file path=ppt/notesSlides/notesSlide34.xml><?xml version="1.0" encoding="utf-8"?>
+<p:notes xmlns:a="http://schemas.openxmlformats.org/drawingml/2006/main" xmlns:r="http://schemas.openxmlformats.org/officeDocument/2006/relationships" xmlns:p="http://schemas.openxmlformats.org/presentationml/2006/main" showMasterSp="0" showMasterPhAnim="0">
+  <p:cSld>
+    <p:spTree>
+      <p:nvGrpSpPr>
         <p:cNvPr id="1" name="Shape 74"/>
         <p:cNvGrpSpPr/>
         <p:nvPr/>
@@ -4996,7 +5185,443 @@
 </p:notes>
 </file>
 
-<file path=ppt/notesSlides/notesSlide34.xml><?xml version="1.0" encoding="utf-8"?>
+<file path=ppt/notesSlides/notesSlide35.xml><?xml version="1.0" encoding="utf-8"?>
+<p:notes xmlns:a="http://schemas.openxmlformats.org/drawingml/2006/main" xmlns:r="http://schemas.openxmlformats.org/officeDocument/2006/relationships" xmlns:p="http://schemas.openxmlformats.org/presentationml/2006/main" showMasterSp="0" showMasterPhAnim="0">
+  <p:cSld>
+    <p:spTree>
+      <p:nvGrpSpPr>
+        <p:cNvPr id="1" name="Shape 74"/>
+        <p:cNvGrpSpPr/>
+        <p:nvPr/>
+      </p:nvGrpSpPr>
+      <p:grpSpPr>
+        <a:xfrm>
+          <a:off x="0" y="0"/>
+          <a:ext cx="0" cy="0"/>
+          <a:chOff x="0" y="0"/>
+          <a:chExt cx="0" cy="0"/>
+        </a:xfrm>
+      </p:grpSpPr>
+      <p:sp>
+        <p:nvSpPr>
+          <p:cNvPr id="75" name="Google Shape;75;gac10fef634_0_20:notes"/>
+          <p:cNvSpPr>
+            <a:spLocks noGrp="1" noRot="1" noChangeAspect="1"/>
+          </p:cNvSpPr>
+          <p:nvPr>
+            <p:ph type="sldImg" idx="2"/>
+          </p:nvPr>
+        </p:nvSpPr>
+        <p:spPr>
+          <a:xfrm>
+            <a:off x="381000" y="685800"/>
+            <a:ext cx="6096000" cy="3429000"/>
+          </a:xfrm>
+          <a:custGeom>
+            <a:avLst/>
+            <a:gdLst/>
+            <a:ahLst/>
+            <a:cxnLst/>
+            <a:rect l="l" t="t" r="r" b="b"/>
+            <a:pathLst>
+              <a:path w="120000" h="120000" extrusionOk="0">
+                <a:moveTo>
+                  <a:pt x="0" y="0"/>
+                </a:moveTo>
+                <a:lnTo>
+                  <a:pt x="120000" y="0"/>
+                </a:lnTo>
+                <a:lnTo>
+                  <a:pt x="120000" y="120000"/>
+                </a:lnTo>
+                <a:lnTo>
+                  <a:pt x="0" y="120000"/>
+                </a:lnTo>
+                <a:close/>
+              </a:path>
+            </a:pathLst>
+          </a:custGeom>
+        </p:spPr>
+      </p:sp>
+      <p:sp>
+        <p:nvSpPr>
+          <p:cNvPr id="76" name="Google Shape;76;gac10fef634_0_20:notes"/>
+          <p:cNvSpPr txBox="1">
+            <a:spLocks noGrp="1"/>
+          </p:cNvSpPr>
+          <p:nvPr>
+            <p:ph type="body" idx="1"/>
+          </p:nvPr>
+        </p:nvSpPr>
+        <p:spPr>
+          <a:xfrm>
+            <a:off x="685800" y="4343400"/>
+            <a:ext cx="5486400" cy="4114800"/>
+          </a:xfrm>
+          <a:prstGeom prst="rect">
+            <a:avLst/>
+          </a:prstGeom>
+        </p:spPr>
+        <p:txBody>
+          <a:bodyPr spcFirstLastPara="1" wrap="square" lIns="91425" tIns="91425" rIns="91425" bIns="91425" anchor="t" anchorCtr="0">
+            <a:noAutofit/>
+          </a:bodyPr>
+          <a:lstStyle/>
+          <a:p>
+            <a:pPr marL="0" lvl="0" indent="0" algn="l" rtl="0">
+              <a:spcBef>
+                <a:spcPts val="0"/>
+              </a:spcBef>
+              <a:spcAft>
+                <a:spcPts val="0"/>
+              </a:spcAft>
+              <a:buNone/>
+            </a:pPr>
+            <a:endParaRPr/>
+          </a:p>
+        </p:txBody>
+      </p:sp>
+    </p:spTree>
+    <p:extLst>
+      <p:ext uri="{BB962C8B-B14F-4D97-AF65-F5344CB8AC3E}">
+        <p14:creationId xmlns:p14="http://schemas.microsoft.com/office/powerpoint/2010/main" val="3132619895"/>
+      </p:ext>
+    </p:extLst>
+  </p:cSld>
+  <p:clrMapOvr>
+    <a:masterClrMapping/>
+  </p:clrMapOvr>
+</p:notes>
+</file>
+
+<file path=ppt/notesSlides/notesSlide36.xml><?xml version="1.0" encoding="utf-8"?>
+<p:notes xmlns:a="http://schemas.openxmlformats.org/drawingml/2006/main" xmlns:r="http://schemas.openxmlformats.org/officeDocument/2006/relationships" xmlns:p="http://schemas.openxmlformats.org/presentationml/2006/main" showMasterSp="0" showMasterPhAnim="0">
+  <p:cSld>
+    <p:spTree>
+      <p:nvGrpSpPr>
+        <p:cNvPr id="1" name="Shape 74"/>
+        <p:cNvGrpSpPr/>
+        <p:nvPr/>
+      </p:nvGrpSpPr>
+      <p:grpSpPr>
+        <a:xfrm>
+          <a:off x="0" y="0"/>
+          <a:ext cx="0" cy="0"/>
+          <a:chOff x="0" y="0"/>
+          <a:chExt cx="0" cy="0"/>
+        </a:xfrm>
+      </p:grpSpPr>
+      <p:sp>
+        <p:nvSpPr>
+          <p:cNvPr id="75" name="Google Shape;75;gac10fef634_0_20:notes"/>
+          <p:cNvSpPr>
+            <a:spLocks noGrp="1" noRot="1" noChangeAspect="1"/>
+          </p:cNvSpPr>
+          <p:nvPr>
+            <p:ph type="sldImg" idx="2"/>
+          </p:nvPr>
+        </p:nvSpPr>
+        <p:spPr>
+          <a:xfrm>
+            <a:off x="381000" y="685800"/>
+            <a:ext cx="6096000" cy="3429000"/>
+          </a:xfrm>
+          <a:custGeom>
+            <a:avLst/>
+            <a:gdLst/>
+            <a:ahLst/>
+            <a:cxnLst/>
+            <a:rect l="l" t="t" r="r" b="b"/>
+            <a:pathLst>
+              <a:path w="120000" h="120000" extrusionOk="0">
+                <a:moveTo>
+                  <a:pt x="0" y="0"/>
+                </a:moveTo>
+                <a:lnTo>
+                  <a:pt x="120000" y="0"/>
+                </a:lnTo>
+                <a:lnTo>
+                  <a:pt x="120000" y="120000"/>
+                </a:lnTo>
+                <a:lnTo>
+                  <a:pt x="0" y="120000"/>
+                </a:lnTo>
+                <a:close/>
+              </a:path>
+            </a:pathLst>
+          </a:custGeom>
+        </p:spPr>
+      </p:sp>
+      <p:sp>
+        <p:nvSpPr>
+          <p:cNvPr id="76" name="Google Shape;76;gac10fef634_0_20:notes"/>
+          <p:cNvSpPr txBox="1">
+            <a:spLocks noGrp="1"/>
+          </p:cNvSpPr>
+          <p:nvPr>
+            <p:ph type="body" idx="1"/>
+          </p:nvPr>
+        </p:nvSpPr>
+        <p:spPr>
+          <a:xfrm>
+            <a:off x="685800" y="4343400"/>
+            <a:ext cx="5486400" cy="4114800"/>
+          </a:xfrm>
+          <a:prstGeom prst="rect">
+            <a:avLst/>
+          </a:prstGeom>
+        </p:spPr>
+        <p:txBody>
+          <a:bodyPr spcFirstLastPara="1" wrap="square" lIns="91425" tIns="91425" rIns="91425" bIns="91425" anchor="t" anchorCtr="0">
+            <a:noAutofit/>
+          </a:bodyPr>
+          <a:lstStyle/>
+          <a:p>
+            <a:pPr marL="0" lvl="0" indent="0" algn="l" rtl="0">
+              <a:spcBef>
+                <a:spcPts val="0"/>
+              </a:spcBef>
+              <a:spcAft>
+                <a:spcPts val="0"/>
+              </a:spcAft>
+              <a:buNone/>
+            </a:pPr>
+            <a:endParaRPr/>
+          </a:p>
+        </p:txBody>
+      </p:sp>
+    </p:spTree>
+    <p:extLst>
+      <p:ext uri="{BB962C8B-B14F-4D97-AF65-F5344CB8AC3E}">
+        <p14:creationId xmlns:p14="http://schemas.microsoft.com/office/powerpoint/2010/main" val="2482371115"/>
+      </p:ext>
+    </p:extLst>
+  </p:cSld>
+  <p:clrMapOvr>
+    <a:masterClrMapping/>
+  </p:clrMapOvr>
+</p:notes>
+</file>
+
+<file path=ppt/notesSlides/notesSlide37.xml><?xml version="1.0" encoding="utf-8"?>
+<p:notes xmlns:a="http://schemas.openxmlformats.org/drawingml/2006/main" xmlns:r="http://schemas.openxmlformats.org/officeDocument/2006/relationships" xmlns:p="http://schemas.openxmlformats.org/presentationml/2006/main" showMasterSp="0" showMasterPhAnim="0">
+  <p:cSld>
+    <p:spTree>
+      <p:nvGrpSpPr>
+        <p:cNvPr id="1" name="Shape 74"/>
+        <p:cNvGrpSpPr/>
+        <p:nvPr/>
+      </p:nvGrpSpPr>
+      <p:grpSpPr>
+        <a:xfrm>
+          <a:off x="0" y="0"/>
+          <a:ext cx="0" cy="0"/>
+          <a:chOff x="0" y="0"/>
+          <a:chExt cx="0" cy="0"/>
+        </a:xfrm>
+      </p:grpSpPr>
+      <p:sp>
+        <p:nvSpPr>
+          <p:cNvPr id="75" name="Google Shape;75;gac10fef634_0_20:notes"/>
+          <p:cNvSpPr>
+            <a:spLocks noGrp="1" noRot="1" noChangeAspect="1"/>
+          </p:cNvSpPr>
+          <p:nvPr>
+            <p:ph type="sldImg" idx="2"/>
+          </p:nvPr>
+        </p:nvSpPr>
+        <p:spPr>
+          <a:xfrm>
+            <a:off x="381000" y="685800"/>
+            <a:ext cx="6096000" cy="3429000"/>
+          </a:xfrm>
+          <a:custGeom>
+            <a:avLst/>
+            <a:gdLst/>
+            <a:ahLst/>
+            <a:cxnLst/>
+            <a:rect l="l" t="t" r="r" b="b"/>
+            <a:pathLst>
+              <a:path w="120000" h="120000" extrusionOk="0">
+                <a:moveTo>
+                  <a:pt x="0" y="0"/>
+                </a:moveTo>
+                <a:lnTo>
+                  <a:pt x="120000" y="0"/>
+                </a:lnTo>
+                <a:lnTo>
+                  <a:pt x="120000" y="120000"/>
+                </a:lnTo>
+                <a:lnTo>
+                  <a:pt x="0" y="120000"/>
+                </a:lnTo>
+                <a:close/>
+              </a:path>
+            </a:pathLst>
+          </a:custGeom>
+        </p:spPr>
+      </p:sp>
+      <p:sp>
+        <p:nvSpPr>
+          <p:cNvPr id="76" name="Google Shape;76;gac10fef634_0_20:notes"/>
+          <p:cNvSpPr txBox="1">
+            <a:spLocks noGrp="1"/>
+          </p:cNvSpPr>
+          <p:nvPr>
+            <p:ph type="body" idx="1"/>
+          </p:nvPr>
+        </p:nvSpPr>
+        <p:spPr>
+          <a:xfrm>
+            <a:off x="685800" y="4343400"/>
+            <a:ext cx="5486400" cy="4114800"/>
+          </a:xfrm>
+          <a:prstGeom prst="rect">
+            <a:avLst/>
+          </a:prstGeom>
+        </p:spPr>
+        <p:txBody>
+          <a:bodyPr spcFirstLastPara="1" wrap="square" lIns="91425" tIns="91425" rIns="91425" bIns="91425" anchor="t" anchorCtr="0">
+            <a:noAutofit/>
+          </a:bodyPr>
+          <a:lstStyle/>
+          <a:p>
+            <a:pPr marL="0" lvl="0" indent="0" algn="l" rtl="0">
+              <a:spcBef>
+                <a:spcPts val="0"/>
+              </a:spcBef>
+              <a:spcAft>
+                <a:spcPts val="0"/>
+              </a:spcAft>
+              <a:buNone/>
+            </a:pPr>
+            <a:endParaRPr/>
+          </a:p>
+        </p:txBody>
+      </p:sp>
+    </p:spTree>
+    <p:extLst>
+      <p:ext uri="{BB962C8B-B14F-4D97-AF65-F5344CB8AC3E}">
+        <p14:creationId xmlns:p14="http://schemas.microsoft.com/office/powerpoint/2010/main" val="309023036"/>
+      </p:ext>
+    </p:extLst>
+  </p:cSld>
+  <p:clrMapOvr>
+    <a:masterClrMapping/>
+  </p:clrMapOvr>
+</p:notes>
+</file>
+
+<file path=ppt/notesSlides/notesSlide38.xml><?xml version="1.0" encoding="utf-8"?>
+<p:notes xmlns:a="http://schemas.openxmlformats.org/drawingml/2006/main" xmlns:r="http://schemas.openxmlformats.org/officeDocument/2006/relationships" xmlns:p="http://schemas.openxmlformats.org/presentationml/2006/main" showMasterSp="0" showMasterPhAnim="0">
+  <p:cSld>
+    <p:spTree>
+      <p:nvGrpSpPr>
+        <p:cNvPr id="1" name="Shape 74"/>
+        <p:cNvGrpSpPr/>
+        <p:nvPr/>
+      </p:nvGrpSpPr>
+      <p:grpSpPr>
+        <a:xfrm>
+          <a:off x="0" y="0"/>
+          <a:ext cx="0" cy="0"/>
+          <a:chOff x="0" y="0"/>
+          <a:chExt cx="0" cy="0"/>
+        </a:xfrm>
+      </p:grpSpPr>
+      <p:sp>
+        <p:nvSpPr>
+          <p:cNvPr id="75" name="Google Shape;75;gac10fef634_0_20:notes"/>
+          <p:cNvSpPr>
+            <a:spLocks noGrp="1" noRot="1" noChangeAspect="1"/>
+          </p:cNvSpPr>
+          <p:nvPr>
+            <p:ph type="sldImg" idx="2"/>
+          </p:nvPr>
+        </p:nvSpPr>
+        <p:spPr>
+          <a:xfrm>
+            <a:off x="381000" y="685800"/>
+            <a:ext cx="6096000" cy="3429000"/>
+          </a:xfrm>
+          <a:custGeom>
+            <a:avLst/>
+            <a:gdLst/>
+            <a:ahLst/>
+            <a:cxnLst/>
+            <a:rect l="l" t="t" r="r" b="b"/>
+            <a:pathLst>
+              <a:path w="120000" h="120000" extrusionOk="0">
+                <a:moveTo>
+                  <a:pt x="0" y="0"/>
+                </a:moveTo>
+                <a:lnTo>
+                  <a:pt x="120000" y="0"/>
+                </a:lnTo>
+                <a:lnTo>
+                  <a:pt x="120000" y="120000"/>
+                </a:lnTo>
+                <a:lnTo>
+                  <a:pt x="0" y="120000"/>
+                </a:lnTo>
+                <a:close/>
+              </a:path>
+            </a:pathLst>
+          </a:custGeom>
+        </p:spPr>
+      </p:sp>
+      <p:sp>
+        <p:nvSpPr>
+          <p:cNvPr id="76" name="Google Shape;76;gac10fef634_0_20:notes"/>
+          <p:cNvSpPr txBox="1">
+            <a:spLocks noGrp="1"/>
+          </p:cNvSpPr>
+          <p:nvPr>
+            <p:ph type="body" idx="1"/>
+          </p:nvPr>
+        </p:nvSpPr>
+        <p:spPr>
+          <a:xfrm>
+            <a:off x="685800" y="4343400"/>
+            <a:ext cx="5486400" cy="4114800"/>
+          </a:xfrm>
+          <a:prstGeom prst="rect">
+            <a:avLst/>
+          </a:prstGeom>
+        </p:spPr>
+        <p:txBody>
+          <a:bodyPr spcFirstLastPara="1" wrap="square" lIns="91425" tIns="91425" rIns="91425" bIns="91425" anchor="t" anchorCtr="0">
+            <a:noAutofit/>
+          </a:bodyPr>
+          <a:lstStyle/>
+          <a:p>
+            <a:pPr marL="0" lvl="0" indent="0" algn="l" rtl="0">
+              <a:spcBef>
+                <a:spcPts val="0"/>
+              </a:spcBef>
+              <a:spcAft>
+                <a:spcPts val="0"/>
+              </a:spcAft>
+              <a:buNone/>
+            </a:pPr>
+            <a:endParaRPr/>
+          </a:p>
+        </p:txBody>
+      </p:sp>
+    </p:spTree>
+    <p:extLst>
+      <p:ext uri="{BB962C8B-B14F-4D97-AF65-F5344CB8AC3E}">
+        <p14:creationId xmlns:p14="http://schemas.microsoft.com/office/powerpoint/2010/main" val="3651148150"/>
+      </p:ext>
+    </p:extLst>
+  </p:cSld>
+  <p:clrMapOvr>
+    <a:masterClrMapping/>
+  </p:clrMapOvr>
+</p:notes>
+</file>
+
+<file path=ppt/notesSlides/notesSlide39.xml><?xml version="1.0" encoding="utf-8"?>
 <p:notes xmlns:a="http://schemas.openxmlformats.org/drawingml/2006/main" xmlns:r="http://schemas.openxmlformats.org/officeDocument/2006/relationships" xmlns:p="http://schemas.openxmlformats.org/presentationml/2006/main" showMasterSp="0" showMasterPhAnim="0">
   <p:cSld>
     <p:spTree>
@@ -5109,114 +5734,6 @@
               </a:spcAft>
               <a:buNone/>
             </a:pPr>
-            <a:endParaRPr/>
-          </a:p>
-        </p:txBody>
-      </p:sp>
-    </p:spTree>
-  </p:cSld>
-  <p:clrMapOvr>
-    <a:masterClrMapping/>
-  </p:clrMapOvr>
-</p:notes>
-</file>
-
-<file path=ppt/notesSlides/notesSlide35.xml><?xml version="1.0" encoding="utf-8"?>
-<p:notes xmlns:a="http://schemas.openxmlformats.org/drawingml/2006/main" xmlns:r="http://schemas.openxmlformats.org/officeDocument/2006/relationships" xmlns:p="http://schemas.openxmlformats.org/presentationml/2006/main" showMasterSp="0" showMasterPhAnim="0">
-  <p:cSld>
-    <p:spTree>
-      <p:nvGrpSpPr>
-        <p:cNvPr id="1" name="Shape 86"/>
-        <p:cNvGrpSpPr/>
-        <p:nvPr/>
-      </p:nvGrpSpPr>
-      <p:grpSpPr>
-        <a:xfrm>
-          <a:off x="0" y="0"/>
-          <a:ext cx="0" cy="0"/>
-          <a:chOff x="0" y="0"/>
-          <a:chExt cx="0" cy="0"/>
-        </a:xfrm>
-      </p:grpSpPr>
-      <p:sp>
-        <p:nvSpPr>
-          <p:cNvPr id="87" name="Google Shape;87;gac10fef634_0_30:notes"/>
-          <p:cNvSpPr>
-            <a:spLocks noGrp="1" noRot="1" noChangeAspect="1"/>
-          </p:cNvSpPr>
-          <p:nvPr>
-            <p:ph type="sldImg" idx="2"/>
-          </p:nvPr>
-        </p:nvSpPr>
-        <p:spPr>
-          <a:xfrm>
-            <a:off x="381000" y="685800"/>
-            <a:ext cx="6096000" cy="3429000"/>
-          </a:xfrm>
-          <a:custGeom>
-            <a:avLst/>
-            <a:gdLst/>
-            <a:ahLst/>
-            <a:cxnLst/>
-            <a:rect l="l" t="t" r="r" b="b"/>
-            <a:pathLst>
-              <a:path w="120000" h="120000" extrusionOk="0">
-                <a:moveTo>
-                  <a:pt x="0" y="0"/>
-                </a:moveTo>
-                <a:lnTo>
-                  <a:pt x="120000" y="0"/>
-                </a:lnTo>
-                <a:lnTo>
-                  <a:pt x="120000" y="120000"/>
-                </a:lnTo>
-                <a:lnTo>
-                  <a:pt x="0" y="120000"/>
-                </a:lnTo>
-                <a:close/>
-              </a:path>
-            </a:pathLst>
-          </a:custGeom>
-        </p:spPr>
-      </p:sp>
-      <p:sp>
-        <p:nvSpPr>
-          <p:cNvPr id="88" name="Google Shape;88;gac10fef634_0_30:notes"/>
-          <p:cNvSpPr txBox="1">
-            <a:spLocks noGrp="1"/>
-          </p:cNvSpPr>
-          <p:nvPr>
-            <p:ph type="body" idx="1"/>
-          </p:nvPr>
-        </p:nvSpPr>
-        <p:spPr>
-          <a:xfrm>
-            <a:off x="685800" y="4343400"/>
-            <a:ext cx="5486400" cy="4114800"/>
-          </a:xfrm>
-          <a:prstGeom prst="rect">
-            <a:avLst/>
-          </a:prstGeom>
-        </p:spPr>
-        <p:txBody>
-          <a:bodyPr spcFirstLastPara="1" wrap="square" lIns="91425" tIns="91425" rIns="91425" bIns="91425" anchor="t" anchorCtr="0">
-            <a:noAutofit/>
-          </a:bodyPr>
-          <a:lstStyle/>
-          <a:p>
-            <a:pPr marL="0" lvl="0" indent="0" algn="l" rtl="0">
-              <a:spcBef>
-                <a:spcPts val="0"/>
-              </a:spcBef>
-              <a:spcAft>
-                <a:spcPts val="0"/>
-              </a:spcAft>
-              <a:buNone/>
-            </a:pPr>
-            <a:r>
-              <a:rPr lang="en"/>
-              <a:t>Discusses how the information from planning, testing and trialling of components assisted in the development of a high-quality outcome</a:t>
-            </a:r>
             <a:endParaRPr/>
           </a:p>
         </p:txBody>
@@ -5321,6 +5838,114 @@
               </a:spcAft>
               <a:buNone/>
             </a:pPr>
+            <a:endParaRPr/>
+          </a:p>
+        </p:txBody>
+      </p:sp>
+    </p:spTree>
+  </p:cSld>
+  <p:clrMapOvr>
+    <a:masterClrMapping/>
+  </p:clrMapOvr>
+</p:notes>
+</file>
+
+<file path=ppt/notesSlides/notesSlide40.xml><?xml version="1.0" encoding="utf-8"?>
+<p:notes xmlns:a="http://schemas.openxmlformats.org/drawingml/2006/main" xmlns:r="http://schemas.openxmlformats.org/officeDocument/2006/relationships" xmlns:p="http://schemas.openxmlformats.org/presentationml/2006/main" showMasterSp="0" showMasterPhAnim="0">
+  <p:cSld>
+    <p:spTree>
+      <p:nvGrpSpPr>
+        <p:cNvPr id="1" name="Shape 86"/>
+        <p:cNvGrpSpPr/>
+        <p:nvPr/>
+      </p:nvGrpSpPr>
+      <p:grpSpPr>
+        <a:xfrm>
+          <a:off x="0" y="0"/>
+          <a:ext cx="0" cy="0"/>
+          <a:chOff x="0" y="0"/>
+          <a:chExt cx="0" cy="0"/>
+        </a:xfrm>
+      </p:grpSpPr>
+      <p:sp>
+        <p:nvSpPr>
+          <p:cNvPr id="87" name="Google Shape;87;gac10fef634_0_30:notes"/>
+          <p:cNvSpPr>
+            <a:spLocks noGrp="1" noRot="1" noChangeAspect="1"/>
+          </p:cNvSpPr>
+          <p:nvPr>
+            <p:ph type="sldImg" idx="2"/>
+          </p:nvPr>
+        </p:nvSpPr>
+        <p:spPr>
+          <a:xfrm>
+            <a:off x="381000" y="685800"/>
+            <a:ext cx="6096000" cy="3429000"/>
+          </a:xfrm>
+          <a:custGeom>
+            <a:avLst/>
+            <a:gdLst/>
+            <a:ahLst/>
+            <a:cxnLst/>
+            <a:rect l="l" t="t" r="r" b="b"/>
+            <a:pathLst>
+              <a:path w="120000" h="120000" extrusionOk="0">
+                <a:moveTo>
+                  <a:pt x="0" y="0"/>
+                </a:moveTo>
+                <a:lnTo>
+                  <a:pt x="120000" y="0"/>
+                </a:lnTo>
+                <a:lnTo>
+                  <a:pt x="120000" y="120000"/>
+                </a:lnTo>
+                <a:lnTo>
+                  <a:pt x="0" y="120000"/>
+                </a:lnTo>
+                <a:close/>
+              </a:path>
+            </a:pathLst>
+          </a:custGeom>
+        </p:spPr>
+      </p:sp>
+      <p:sp>
+        <p:nvSpPr>
+          <p:cNvPr id="88" name="Google Shape;88;gac10fef634_0_30:notes"/>
+          <p:cNvSpPr txBox="1">
+            <a:spLocks noGrp="1"/>
+          </p:cNvSpPr>
+          <p:nvPr>
+            <p:ph type="body" idx="1"/>
+          </p:nvPr>
+        </p:nvSpPr>
+        <p:spPr>
+          <a:xfrm>
+            <a:off x="685800" y="4343400"/>
+            <a:ext cx="5486400" cy="4114800"/>
+          </a:xfrm>
+          <a:prstGeom prst="rect">
+            <a:avLst/>
+          </a:prstGeom>
+        </p:spPr>
+        <p:txBody>
+          <a:bodyPr spcFirstLastPara="1" wrap="square" lIns="91425" tIns="91425" rIns="91425" bIns="91425" anchor="t" anchorCtr="0">
+            <a:noAutofit/>
+          </a:bodyPr>
+          <a:lstStyle/>
+          <a:p>
+            <a:pPr marL="0" lvl="0" indent="0" algn="l" rtl="0">
+              <a:spcBef>
+                <a:spcPts val="0"/>
+              </a:spcBef>
+              <a:spcAft>
+                <a:spcPts val="0"/>
+              </a:spcAft>
+              <a:buNone/>
+            </a:pPr>
+            <a:r>
+              <a:rPr lang="en"/>
+              <a:t>Discusses how the information from planning, testing and trialling of components assisted in the development of a high-quality outcome</a:t>
+            </a:r>
             <a:endParaRPr/>
           </a:p>
         </p:txBody>
@@ -17335,12 +17960,8 @@
               <a:buNone/>
             </a:pPr>
             <a:r>
-              <a:rPr lang="en"/>
-              <a:t>Component 6 v1 </a:t>
-            </a:r>
-            <a:r>
               <a:rPr lang="en" dirty="0"/>
-              <a:t>- Test Plan (and screenshot)</a:t>
+              <a:t>Component 6 v1 - Test Plan (and screenshot)</a:t>
             </a:r>
             <a:endParaRPr dirty="0"/>
           </a:p>
@@ -17600,6 +18221,120 @@
 <file path=ppt/slides/slide33.xml><?xml version="1.0" encoding="utf-8"?>
 <p:sld xmlns:a="http://schemas.openxmlformats.org/drawingml/2006/main" xmlns:r="http://schemas.openxmlformats.org/officeDocument/2006/relationships" xmlns:p="http://schemas.openxmlformats.org/presentationml/2006/main">
   <p:cSld>
+    <p:bg>
+      <p:bgPr>
+        <a:solidFill>
+          <a:srgbClr val="D9EAD3"/>
+        </a:solidFill>
+        <a:effectLst/>
+      </p:bgPr>
+    </p:bg>
+    <p:spTree>
+      <p:nvGrpSpPr>
+        <p:cNvPr id="1" name="Shape 72"/>
+        <p:cNvGrpSpPr/>
+        <p:nvPr/>
+      </p:nvGrpSpPr>
+      <p:grpSpPr>
+        <a:xfrm>
+          <a:off x="0" y="0"/>
+          <a:ext cx="0" cy="0"/>
+          <a:chOff x="0" y="0"/>
+          <a:chExt cx="0" cy="0"/>
+        </a:xfrm>
+      </p:grpSpPr>
+      <p:sp>
+        <p:nvSpPr>
+          <p:cNvPr id="73" name="Google Shape;73;p16"/>
+          <p:cNvSpPr txBox="1">
+            <a:spLocks noGrp="1"/>
+          </p:cNvSpPr>
+          <p:nvPr>
+            <p:ph type="title"/>
+          </p:nvPr>
+        </p:nvSpPr>
+        <p:spPr>
+          <a:xfrm>
+            <a:off x="311700" y="445025"/>
+            <a:ext cx="8520600" cy="572700"/>
+          </a:xfrm>
+          <a:prstGeom prst="rect">
+            <a:avLst/>
+          </a:prstGeom>
+        </p:spPr>
+        <p:txBody>
+          <a:bodyPr spcFirstLastPara="1" wrap="square" lIns="91425" tIns="91425" rIns="91425" bIns="91425" anchor="t" anchorCtr="0">
+            <a:noAutofit/>
+          </a:bodyPr>
+          <a:lstStyle/>
+          <a:p>
+            <a:pPr marL="0" lvl="0" indent="0" algn="l" rtl="0">
+              <a:spcBef>
+                <a:spcPts val="0"/>
+              </a:spcBef>
+              <a:spcAft>
+                <a:spcPts val="0"/>
+              </a:spcAft>
+              <a:buNone/>
+            </a:pPr>
+            <a:r>
+              <a:rPr lang="en"/>
+              <a:t>Component 6 </a:t>
+            </a:r>
+            <a:r>
+              <a:rPr lang="en" dirty="0"/>
+              <a:t>(Trello screenshot)</a:t>
+            </a:r>
+            <a:endParaRPr dirty="0"/>
+          </a:p>
+        </p:txBody>
+      </p:sp>
+      <p:pic>
+        <p:nvPicPr>
+          <p:cNvPr id="3" name="Picture 2">
+            <a:extLst>
+              <a:ext uri="{FF2B5EF4-FFF2-40B4-BE49-F238E27FC236}">
+                <a16:creationId xmlns:a16="http://schemas.microsoft.com/office/drawing/2014/main" id="{C97ED042-3250-119B-D71A-D56AD12CC0C9}"/>
+              </a:ext>
+            </a:extLst>
+          </p:cNvPr>
+          <p:cNvPicPr>
+            <a:picLocks noChangeAspect="1"/>
+          </p:cNvPicPr>
+          <p:nvPr/>
+        </p:nvPicPr>
+        <p:blipFill>
+          <a:blip r:embed="rId3"/>
+          <a:stretch>
+            <a:fillRect/>
+          </a:stretch>
+        </p:blipFill>
+        <p:spPr>
+          <a:xfrm>
+            <a:off x="868680" y="1017725"/>
+            <a:ext cx="7216541" cy="3934285"/>
+          </a:xfrm>
+          <a:prstGeom prst="rect">
+            <a:avLst/>
+          </a:prstGeom>
+        </p:spPr>
+      </p:pic>
+    </p:spTree>
+    <p:extLst>
+      <p:ext uri="{BB962C8B-B14F-4D97-AF65-F5344CB8AC3E}">
+        <p14:creationId xmlns:p14="http://schemas.microsoft.com/office/powerpoint/2010/main" val="1440993590"/>
+      </p:ext>
+    </p:extLst>
+  </p:cSld>
+  <p:clrMapOvr>
+    <a:masterClrMapping/>
+  </p:clrMapOvr>
+</p:sld>
+</file>
+
+<file path=ppt/slides/slide34.xml><?xml version="1.0" encoding="utf-8"?>
+<p:sld xmlns:a="http://schemas.openxmlformats.org/drawingml/2006/main" xmlns:r="http://schemas.openxmlformats.org/officeDocument/2006/relationships" xmlns:p="http://schemas.openxmlformats.org/presentationml/2006/main">
+  <p:cSld>
     <p:spTree>
       <p:nvGrpSpPr>
         <p:cNvPr id="1" name="Shape 77"/>
@@ -17834,7 +18569,1194 @@
 </p:sld>
 </file>
 
-<file path=ppt/slides/slide34.xml><?xml version="1.0" encoding="utf-8"?>
+<file path=ppt/slides/slide35.xml><?xml version="1.0" encoding="utf-8"?>
+<p:sld xmlns:a="http://schemas.openxmlformats.org/drawingml/2006/main" xmlns:r="http://schemas.openxmlformats.org/officeDocument/2006/relationships" xmlns:p="http://schemas.openxmlformats.org/presentationml/2006/main">
+  <p:cSld>
+    <p:spTree>
+      <p:nvGrpSpPr>
+        <p:cNvPr id="1" name="Shape 77"/>
+        <p:cNvGrpSpPr/>
+        <p:nvPr/>
+      </p:nvGrpSpPr>
+      <p:grpSpPr>
+        <a:xfrm>
+          <a:off x="0" y="0"/>
+          <a:ext cx="0" cy="0"/>
+          <a:chOff x="0" y="0"/>
+          <a:chExt cx="0" cy="0"/>
+        </a:xfrm>
+      </p:grpSpPr>
+      <p:sp>
+        <p:nvSpPr>
+          <p:cNvPr id="78" name="Google Shape;78;p17"/>
+          <p:cNvSpPr txBox="1">
+            <a:spLocks noGrp="1"/>
+          </p:cNvSpPr>
+          <p:nvPr>
+            <p:ph type="title"/>
+          </p:nvPr>
+        </p:nvSpPr>
+        <p:spPr>
+          <a:xfrm>
+            <a:off x="311700" y="445025"/>
+            <a:ext cx="8520600" cy="572700"/>
+          </a:xfrm>
+          <a:prstGeom prst="rect">
+            <a:avLst/>
+          </a:prstGeom>
+        </p:spPr>
+        <p:txBody>
+          <a:bodyPr spcFirstLastPara="1" wrap="square" lIns="91425" tIns="91425" rIns="91425" bIns="91425" anchor="t" anchorCtr="0">
+            <a:noAutofit/>
+          </a:bodyPr>
+          <a:lstStyle/>
+          <a:p>
+            <a:pPr marL="0" lvl="0" indent="0" algn="l" rtl="0">
+              <a:spcBef>
+                <a:spcPts val="0"/>
+              </a:spcBef>
+              <a:spcAft>
+                <a:spcPts val="0"/>
+              </a:spcAft>
+              <a:buNone/>
+            </a:pPr>
+            <a:r>
+              <a:rPr lang="en" dirty="0"/>
+              <a:t>Component  v - Test Plan (and screenshot)</a:t>
+            </a:r>
+            <a:endParaRPr dirty="0"/>
+          </a:p>
+        </p:txBody>
+      </p:sp>
+      <p:graphicFrame>
+        <p:nvGraphicFramePr>
+          <p:cNvPr id="79" name="Google Shape;79;p17"/>
+          <p:cNvGraphicFramePr/>
+          <p:nvPr>
+            <p:extLst>
+              <p:ext uri="{D42A27DB-BD31-4B8C-83A1-F6EECF244321}">
+                <p14:modId xmlns:p14="http://schemas.microsoft.com/office/powerpoint/2010/main" val="277716855"/>
+              </p:ext>
+            </p:extLst>
+          </p:nvPr>
+        </p:nvGraphicFramePr>
+        <p:xfrm>
+          <a:off x="311700" y="3007389"/>
+          <a:ext cx="8520600" cy="2285940"/>
+        </p:xfrm>
+        <a:graphic>
+          <a:graphicData uri="http://schemas.openxmlformats.org/drawingml/2006/table">
+            <a:tbl>
+              <a:tblPr>
+                <a:noFill/>
+                <a:tableStyleId>{E1099E06-0E6B-448D-9D27-60429F06E6F4}</a:tableStyleId>
+              </a:tblPr>
+              <a:tblGrid>
+                <a:gridCol w="2709796">
+                  <a:extLst>
+                    <a:ext uri="{9D8B030D-6E8A-4147-A177-3AD203B41FA5}">
+                      <a16:colId xmlns:a16="http://schemas.microsoft.com/office/drawing/2014/main" val="20000"/>
+                    </a:ext>
+                  </a:extLst>
+                </a:gridCol>
+                <a:gridCol w="5810804">
+                  <a:extLst>
+                    <a:ext uri="{9D8B030D-6E8A-4147-A177-3AD203B41FA5}">
+                      <a16:colId xmlns:a16="http://schemas.microsoft.com/office/drawing/2014/main" val="20001"/>
+                    </a:ext>
+                  </a:extLst>
+                </a:gridCol>
+              </a:tblGrid>
+              <a:tr h="381000">
+                <a:tc>
+                  <a:txBody>
+                    <a:bodyPr/>
+                    <a:lstStyle/>
+                    <a:p>
+                      <a:pPr marL="0" lvl="0" indent="0" algn="l" rtl="0">
+                        <a:spcBef>
+                          <a:spcPts val="0"/>
+                        </a:spcBef>
+                        <a:spcAft>
+                          <a:spcPts val="0"/>
+                        </a:spcAft>
+                        <a:buNone/>
+                      </a:pPr>
+                      <a:r>
+                        <a:rPr lang="en" sz="1800" b="1" dirty="0"/>
+                        <a:t>Test Case</a:t>
+                      </a:r>
+                      <a:endParaRPr sz="1800" b="1" dirty="0"/>
+                    </a:p>
+                  </a:txBody>
+                  <a:tcPr marL="91425" marR="91425" marT="91425" marB="91425">
+                    <a:solidFill>
+                      <a:srgbClr val="CCCCCC"/>
+                    </a:solidFill>
+                  </a:tcPr>
+                </a:tc>
+                <a:tc>
+                  <a:txBody>
+                    <a:bodyPr/>
+                    <a:lstStyle/>
+                    <a:p>
+                      <a:pPr marL="0" lvl="0" indent="0" algn="l" rtl="0">
+                        <a:spcBef>
+                          <a:spcPts val="0"/>
+                        </a:spcBef>
+                        <a:spcAft>
+                          <a:spcPts val="0"/>
+                        </a:spcAft>
+                        <a:buNone/>
+                      </a:pPr>
+                      <a:r>
+                        <a:rPr lang="en" sz="1800" b="1" dirty="0"/>
+                        <a:t>Expected Values</a:t>
+                      </a:r>
+                      <a:endParaRPr sz="1800" b="1" dirty="0"/>
+                    </a:p>
+                  </a:txBody>
+                  <a:tcPr marL="91425" marR="91425" marT="91425" marB="91425">
+                    <a:solidFill>
+                      <a:srgbClr val="CCCCCC"/>
+                    </a:solidFill>
+                  </a:tcPr>
+                </a:tc>
+                <a:extLst>
+                  <a:ext uri="{0D108BD9-81ED-4DB2-BD59-A6C34878D82A}">
+                    <a16:rowId xmlns:a16="http://schemas.microsoft.com/office/drawing/2014/main" val="10000"/>
+                  </a:ext>
+                </a:extLst>
+              </a:tr>
+              <a:tr h="396200">
+                <a:tc>
+                  <a:txBody>
+                    <a:bodyPr/>
+                    <a:lstStyle/>
+                    <a:p>
+                      <a:pPr marL="0" marR="0" lvl="0" indent="0" algn="l" defTabSz="914400" rtl="0" eaLnBrk="1" fontAlgn="auto" latinLnBrk="0" hangingPunct="1">
+                        <a:lnSpc>
+                          <a:spcPct val="100000"/>
+                        </a:lnSpc>
+                        <a:spcBef>
+                          <a:spcPts val="0"/>
+                        </a:spcBef>
+                        <a:spcAft>
+                          <a:spcPts val="0"/>
+                        </a:spcAft>
+                        <a:buClr>
+                          <a:srgbClr val="000000"/>
+                        </a:buClr>
+                        <a:buSzTx/>
+                        <a:buFont typeface="Arial"/>
+                        <a:buNone/>
+                        <a:tabLst/>
+                        <a:defRPr/>
+                      </a:pPr>
+                      <a:r>
+                        <a:rPr lang="en-US" sz="1800" dirty="0"/>
+                        <a:t>Input not a number</a:t>
+                      </a:r>
+                    </a:p>
+                    <a:p>
+                      <a:pPr marL="0" marR="0" lvl="0" indent="0" algn="l" defTabSz="914400" rtl="0" eaLnBrk="1" fontAlgn="auto" latinLnBrk="0" hangingPunct="1">
+                        <a:lnSpc>
+                          <a:spcPct val="100000"/>
+                        </a:lnSpc>
+                        <a:spcBef>
+                          <a:spcPts val="0"/>
+                        </a:spcBef>
+                        <a:spcAft>
+                          <a:spcPts val="0"/>
+                        </a:spcAft>
+                        <a:buClr>
+                          <a:srgbClr val="000000"/>
+                        </a:buClr>
+                        <a:buSzTx/>
+                        <a:buFont typeface="Arial"/>
+                        <a:buNone/>
+                        <a:tabLst/>
+                        <a:defRPr/>
+                      </a:pPr>
+                      <a:r>
+                        <a:rPr lang="en-US" sz="1800" dirty="0"/>
+                        <a:t>Input a number above 5</a:t>
+                      </a:r>
+                    </a:p>
+                    <a:p>
+                      <a:pPr marL="0" marR="0" lvl="0" indent="0" algn="l" defTabSz="914400" rtl="0" eaLnBrk="1" fontAlgn="auto" latinLnBrk="0" hangingPunct="1">
+                        <a:lnSpc>
+                          <a:spcPct val="100000"/>
+                        </a:lnSpc>
+                        <a:spcBef>
+                          <a:spcPts val="0"/>
+                        </a:spcBef>
+                        <a:spcAft>
+                          <a:spcPts val="0"/>
+                        </a:spcAft>
+                        <a:buClr>
+                          <a:srgbClr val="000000"/>
+                        </a:buClr>
+                        <a:buSzTx/>
+                        <a:buFont typeface="Arial"/>
+                        <a:buNone/>
+                        <a:tabLst/>
+                        <a:defRPr/>
+                      </a:pPr>
+                      <a:r>
+                        <a:rPr lang="en-US" sz="1800" dirty="0"/>
+                        <a:t>Input 2</a:t>
+                      </a:r>
+                    </a:p>
+                    <a:p>
+                      <a:pPr marL="0" marR="0" lvl="0" indent="0" algn="l" defTabSz="914400" rtl="0" eaLnBrk="1" fontAlgn="auto" latinLnBrk="0" hangingPunct="1">
+                        <a:lnSpc>
+                          <a:spcPct val="100000"/>
+                        </a:lnSpc>
+                        <a:spcBef>
+                          <a:spcPts val="0"/>
+                        </a:spcBef>
+                        <a:spcAft>
+                          <a:spcPts val="0"/>
+                        </a:spcAft>
+                        <a:buClr>
+                          <a:srgbClr val="000000"/>
+                        </a:buClr>
+                        <a:buSzTx/>
+                        <a:buFont typeface="Arial"/>
+                        <a:buNone/>
+                        <a:tabLst/>
+                        <a:defRPr/>
+                      </a:pPr>
+                      <a:r>
+                        <a:rPr lang="en-US" sz="1800" dirty="0"/>
+                        <a:t>Input 4 and 8</a:t>
+                      </a:r>
+                    </a:p>
+                    <a:p>
+                      <a:pPr marL="0" lvl="0" indent="0" algn="l" rtl="0">
+                        <a:spcBef>
+                          <a:spcPts val="0"/>
+                        </a:spcBef>
+                        <a:spcAft>
+                          <a:spcPts val="0"/>
+                        </a:spcAft>
+                        <a:buNone/>
+                      </a:pPr>
+                      <a:endParaRPr sz="1800" dirty="0"/>
+                    </a:p>
+                  </a:txBody>
+                  <a:tcPr marL="91425" marR="91425" marT="91425" marB="91425"/>
+                </a:tc>
+                <a:tc>
+                  <a:txBody>
+                    <a:bodyPr/>
+                    <a:lstStyle/>
+                    <a:p>
+                      <a:pPr marL="0" lvl="0" indent="0" algn="l" rtl="0">
+                        <a:spcBef>
+                          <a:spcPts val="0"/>
+                        </a:spcBef>
+                        <a:spcAft>
+                          <a:spcPts val="0"/>
+                        </a:spcAft>
+                        <a:buNone/>
+                      </a:pPr>
+                      <a:r>
+                        <a:rPr lang="en-US" sz="1800" dirty="0"/>
+                        <a:t>Printed that is not a number and asks for input again</a:t>
+                      </a:r>
+                    </a:p>
+                    <a:p>
+                      <a:pPr marL="0" marR="0" lvl="0" indent="0" algn="l" defTabSz="914400" rtl="0" eaLnBrk="1" fontAlgn="auto" latinLnBrk="0" hangingPunct="1">
+                        <a:lnSpc>
+                          <a:spcPct val="100000"/>
+                        </a:lnSpc>
+                        <a:spcBef>
+                          <a:spcPts val="0"/>
+                        </a:spcBef>
+                        <a:spcAft>
+                          <a:spcPts val="0"/>
+                        </a:spcAft>
+                        <a:buClr>
+                          <a:srgbClr val="000000"/>
+                        </a:buClr>
+                        <a:buSzTx/>
+                        <a:buFont typeface="Arial"/>
+                        <a:buNone/>
+                        <a:tabLst/>
+                        <a:defRPr/>
+                      </a:pPr>
+                      <a:r>
+                        <a:rPr lang="en-US" sz="1800" dirty="0"/>
+                        <a:t>Printed number must be 1-5 and asks for input again</a:t>
+                      </a:r>
+                    </a:p>
+                    <a:p>
+                      <a:pPr marL="0" marR="0" lvl="0" indent="0" algn="l" defTabSz="914400" rtl="0" eaLnBrk="1" fontAlgn="auto" latinLnBrk="0" hangingPunct="1">
+                        <a:lnSpc>
+                          <a:spcPct val="100000"/>
+                        </a:lnSpc>
+                        <a:spcBef>
+                          <a:spcPts val="0"/>
+                        </a:spcBef>
+                        <a:spcAft>
+                          <a:spcPts val="0"/>
+                        </a:spcAft>
+                        <a:buClr>
+                          <a:srgbClr val="000000"/>
+                        </a:buClr>
+                        <a:buSzTx/>
+                        <a:buFont typeface="Arial"/>
+                        <a:buNone/>
+                        <a:tabLst/>
+                        <a:defRPr/>
+                      </a:pPr>
+                      <a:r>
+                        <a:rPr lang="en-US" sz="1800" dirty="0"/>
+                        <a:t>Accepted input and prints choose which pizzas</a:t>
+                      </a:r>
+                    </a:p>
+                    <a:p>
+                      <a:pPr marL="0" marR="0" lvl="0" indent="0" algn="l" defTabSz="914400" rtl="0" eaLnBrk="1" fontAlgn="auto" latinLnBrk="0" hangingPunct="1">
+                        <a:lnSpc>
+                          <a:spcPct val="100000"/>
+                        </a:lnSpc>
+                        <a:spcBef>
+                          <a:spcPts val="0"/>
+                        </a:spcBef>
+                        <a:spcAft>
+                          <a:spcPts val="0"/>
+                        </a:spcAft>
+                        <a:buClr>
+                          <a:srgbClr val="000000"/>
+                        </a:buClr>
+                        <a:buSzTx/>
+                        <a:buFont typeface="Arial"/>
+                        <a:buNone/>
+                        <a:tabLst/>
+                        <a:defRPr/>
+                      </a:pPr>
+                      <a:r>
+                        <a:rPr lang="en-US" sz="1800" dirty="0"/>
+                        <a:t>Correctly picks pizzas and costs and prints chosen pizza </a:t>
+                      </a:r>
+                      <a:r>
+                        <a:rPr lang="en-US" sz="1800"/>
+                        <a:t>and its cost</a:t>
+                      </a:r>
+                      <a:endParaRPr lang="en-US" sz="1800" dirty="0"/>
+                    </a:p>
+                    <a:p>
+                      <a:pPr marL="0" lvl="0" indent="0" algn="l" rtl="0">
+                        <a:spcBef>
+                          <a:spcPts val="0"/>
+                        </a:spcBef>
+                        <a:spcAft>
+                          <a:spcPts val="0"/>
+                        </a:spcAft>
+                        <a:buNone/>
+                      </a:pPr>
+                      <a:endParaRPr sz="1800" dirty="0"/>
+                    </a:p>
+                  </a:txBody>
+                  <a:tcPr marL="91425" marR="91425" marT="91425" marB="91425"/>
+                </a:tc>
+                <a:extLst>
+                  <a:ext uri="{0D108BD9-81ED-4DB2-BD59-A6C34878D82A}">
+                    <a16:rowId xmlns:a16="http://schemas.microsoft.com/office/drawing/2014/main" val="10001"/>
+                  </a:ext>
+                </a:extLst>
+              </a:tr>
+            </a:tbl>
+          </a:graphicData>
+        </a:graphic>
+      </p:graphicFrame>
+      <p:pic>
+        <p:nvPicPr>
+          <p:cNvPr id="2" name="Picture 1">
+            <a:extLst>
+              <a:ext uri="{FF2B5EF4-FFF2-40B4-BE49-F238E27FC236}">
+                <a16:creationId xmlns:a16="http://schemas.microsoft.com/office/drawing/2014/main" id="{70C9E6F6-3762-3950-6471-9B63E843D96F}"/>
+              </a:ext>
+            </a:extLst>
+          </p:cNvPr>
+          <p:cNvPicPr>
+            <a:picLocks noChangeAspect="1"/>
+          </p:cNvPicPr>
+          <p:nvPr/>
+        </p:nvPicPr>
+        <p:blipFill>
+          <a:blip r:embed="rId3"/>
+          <a:stretch>
+            <a:fillRect/>
+          </a:stretch>
+        </p:blipFill>
+        <p:spPr>
+          <a:xfrm>
+            <a:off x="311700" y="1203157"/>
+            <a:ext cx="3172848" cy="1618800"/>
+          </a:xfrm>
+          <a:prstGeom prst="rect">
+            <a:avLst/>
+          </a:prstGeom>
+        </p:spPr>
+      </p:pic>
+      <p:pic>
+        <p:nvPicPr>
+          <p:cNvPr id="3" name="Picture 2">
+            <a:extLst>
+              <a:ext uri="{FF2B5EF4-FFF2-40B4-BE49-F238E27FC236}">
+                <a16:creationId xmlns:a16="http://schemas.microsoft.com/office/drawing/2014/main" id="{0CD4E232-D441-1E34-6100-A444C96D1F3A}"/>
+              </a:ext>
+            </a:extLst>
+          </p:cNvPr>
+          <p:cNvPicPr>
+            <a:picLocks noChangeAspect="1"/>
+          </p:cNvPicPr>
+          <p:nvPr/>
+        </p:nvPicPr>
+        <p:blipFill>
+          <a:blip r:embed="rId4"/>
+          <a:stretch>
+            <a:fillRect/>
+          </a:stretch>
+        </p:blipFill>
+        <p:spPr>
+          <a:xfrm>
+            <a:off x="4783087" y="1203157"/>
+            <a:ext cx="3677519" cy="1471008"/>
+          </a:xfrm>
+          <a:prstGeom prst="rect">
+            <a:avLst/>
+          </a:prstGeom>
+        </p:spPr>
+      </p:pic>
+    </p:spTree>
+    <p:extLst>
+      <p:ext uri="{BB962C8B-B14F-4D97-AF65-F5344CB8AC3E}">
+        <p14:creationId xmlns:p14="http://schemas.microsoft.com/office/powerpoint/2010/main" val="839176086"/>
+      </p:ext>
+    </p:extLst>
+  </p:cSld>
+  <p:clrMapOvr>
+    <a:masterClrMapping/>
+  </p:clrMapOvr>
+</p:sld>
+</file>
+
+<file path=ppt/slides/slide36.xml><?xml version="1.0" encoding="utf-8"?>
+<p:sld xmlns:a="http://schemas.openxmlformats.org/drawingml/2006/main" xmlns:r="http://schemas.openxmlformats.org/officeDocument/2006/relationships" xmlns:p="http://schemas.openxmlformats.org/presentationml/2006/main">
+  <p:cSld>
+    <p:spTree>
+      <p:nvGrpSpPr>
+        <p:cNvPr id="1" name="Shape 77"/>
+        <p:cNvGrpSpPr/>
+        <p:nvPr/>
+      </p:nvGrpSpPr>
+      <p:grpSpPr>
+        <a:xfrm>
+          <a:off x="0" y="0"/>
+          <a:ext cx="0" cy="0"/>
+          <a:chOff x="0" y="0"/>
+          <a:chExt cx="0" cy="0"/>
+        </a:xfrm>
+      </p:grpSpPr>
+      <p:sp>
+        <p:nvSpPr>
+          <p:cNvPr id="78" name="Google Shape;78;p17"/>
+          <p:cNvSpPr txBox="1">
+            <a:spLocks noGrp="1"/>
+          </p:cNvSpPr>
+          <p:nvPr>
+            <p:ph type="title"/>
+          </p:nvPr>
+        </p:nvSpPr>
+        <p:spPr>
+          <a:xfrm>
+            <a:off x="311700" y="445025"/>
+            <a:ext cx="8520600" cy="572700"/>
+          </a:xfrm>
+          <a:prstGeom prst="rect">
+            <a:avLst/>
+          </a:prstGeom>
+        </p:spPr>
+        <p:txBody>
+          <a:bodyPr spcFirstLastPara="1" wrap="square" lIns="91425" tIns="91425" rIns="91425" bIns="91425" anchor="t" anchorCtr="0">
+            <a:noAutofit/>
+          </a:bodyPr>
+          <a:lstStyle/>
+          <a:p>
+            <a:pPr marL="0" lvl="0" indent="0" algn="l" rtl="0">
+              <a:spcBef>
+                <a:spcPts val="0"/>
+              </a:spcBef>
+              <a:spcAft>
+                <a:spcPts val="0"/>
+              </a:spcAft>
+              <a:buNone/>
+            </a:pPr>
+            <a:r>
+              <a:rPr lang="en" dirty="0"/>
+              <a:t>Component  v - Test Plan (and screenshot)</a:t>
+            </a:r>
+            <a:endParaRPr dirty="0"/>
+          </a:p>
+        </p:txBody>
+      </p:sp>
+      <p:graphicFrame>
+        <p:nvGraphicFramePr>
+          <p:cNvPr id="79" name="Google Shape;79;p17"/>
+          <p:cNvGraphicFramePr/>
+          <p:nvPr/>
+        </p:nvGraphicFramePr>
+        <p:xfrm>
+          <a:off x="311700" y="3794967"/>
+          <a:ext cx="8520600" cy="1188660"/>
+        </p:xfrm>
+        <a:graphic>
+          <a:graphicData uri="http://schemas.openxmlformats.org/drawingml/2006/table">
+            <a:tbl>
+              <a:tblPr>
+                <a:noFill/>
+                <a:tableStyleId>{E1099E06-0E6B-448D-9D27-60429F06E6F4}</a:tableStyleId>
+              </a:tblPr>
+              <a:tblGrid>
+                <a:gridCol w="2709796">
+                  <a:extLst>
+                    <a:ext uri="{9D8B030D-6E8A-4147-A177-3AD203B41FA5}">
+                      <a16:colId xmlns:a16="http://schemas.microsoft.com/office/drawing/2014/main" val="20000"/>
+                    </a:ext>
+                  </a:extLst>
+                </a:gridCol>
+                <a:gridCol w="5810804">
+                  <a:extLst>
+                    <a:ext uri="{9D8B030D-6E8A-4147-A177-3AD203B41FA5}">
+                      <a16:colId xmlns:a16="http://schemas.microsoft.com/office/drawing/2014/main" val="20001"/>
+                    </a:ext>
+                  </a:extLst>
+                </a:gridCol>
+              </a:tblGrid>
+              <a:tr h="381000">
+                <a:tc>
+                  <a:txBody>
+                    <a:bodyPr/>
+                    <a:lstStyle/>
+                    <a:p>
+                      <a:pPr marL="0" lvl="0" indent="0" algn="l" rtl="0">
+                        <a:spcBef>
+                          <a:spcPts val="0"/>
+                        </a:spcBef>
+                        <a:spcAft>
+                          <a:spcPts val="0"/>
+                        </a:spcAft>
+                        <a:buNone/>
+                      </a:pPr>
+                      <a:r>
+                        <a:rPr lang="en" sz="1800" b="1" dirty="0"/>
+                        <a:t>Test Case</a:t>
+                      </a:r>
+                      <a:endParaRPr sz="1800" b="1" dirty="0"/>
+                    </a:p>
+                  </a:txBody>
+                  <a:tcPr marL="91425" marR="91425" marT="91425" marB="91425">
+                    <a:solidFill>
+                      <a:srgbClr val="CCCCCC"/>
+                    </a:solidFill>
+                  </a:tcPr>
+                </a:tc>
+                <a:tc>
+                  <a:txBody>
+                    <a:bodyPr/>
+                    <a:lstStyle/>
+                    <a:p>
+                      <a:pPr marL="0" lvl="0" indent="0" algn="l" rtl="0">
+                        <a:spcBef>
+                          <a:spcPts val="0"/>
+                        </a:spcBef>
+                        <a:spcAft>
+                          <a:spcPts val="0"/>
+                        </a:spcAft>
+                        <a:buNone/>
+                      </a:pPr>
+                      <a:r>
+                        <a:rPr lang="en" sz="1800" b="1" dirty="0"/>
+                        <a:t>Expected Values</a:t>
+                      </a:r>
+                      <a:endParaRPr sz="1800" b="1" dirty="0"/>
+                    </a:p>
+                  </a:txBody>
+                  <a:tcPr marL="91425" marR="91425" marT="91425" marB="91425">
+                    <a:solidFill>
+                      <a:srgbClr val="CCCCCC"/>
+                    </a:solidFill>
+                  </a:tcPr>
+                </a:tc>
+                <a:extLst>
+                  <a:ext uri="{0D108BD9-81ED-4DB2-BD59-A6C34878D82A}">
+                    <a16:rowId xmlns:a16="http://schemas.microsoft.com/office/drawing/2014/main" val="10000"/>
+                  </a:ext>
+                </a:extLst>
+              </a:tr>
+              <a:tr h="396200">
+                <a:tc>
+                  <a:txBody>
+                    <a:bodyPr/>
+                    <a:lstStyle/>
+                    <a:p>
+                      <a:pPr marL="0" marR="0" lvl="0" indent="0" algn="l" defTabSz="914400" rtl="0" eaLnBrk="1" fontAlgn="auto" latinLnBrk="0" hangingPunct="1">
+                        <a:lnSpc>
+                          <a:spcPct val="100000"/>
+                        </a:lnSpc>
+                        <a:spcBef>
+                          <a:spcPts val="0"/>
+                        </a:spcBef>
+                        <a:spcAft>
+                          <a:spcPts val="0"/>
+                        </a:spcAft>
+                        <a:buClr>
+                          <a:srgbClr val="000000"/>
+                        </a:buClr>
+                        <a:buSzTx/>
+                        <a:buFont typeface="Arial"/>
+                        <a:buNone/>
+                        <a:tabLst/>
+                        <a:defRPr/>
+                      </a:pPr>
+                      <a:endParaRPr lang="en-US" sz="1800" dirty="0"/>
+                    </a:p>
+                    <a:p>
+                      <a:pPr marL="0" lvl="0" indent="0" algn="l" rtl="0">
+                        <a:spcBef>
+                          <a:spcPts val="0"/>
+                        </a:spcBef>
+                        <a:spcAft>
+                          <a:spcPts val="0"/>
+                        </a:spcAft>
+                        <a:buNone/>
+                      </a:pPr>
+                      <a:endParaRPr sz="1800" dirty="0"/>
+                    </a:p>
+                  </a:txBody>
+                  <a:tcPr marL="91425" marR="91425" marT="91425" marB="91425"/>
+                </a:tc>
+                <a:tc>
+                  <a:txBody>
+                    <a:bodyPr/>
+                    <a:lstStyle/>
+                    <a:p>
+                      <a:pPr marL="0" lvl="0" indent="0" algn="l" rtl="0">
+                        <a:spcBef>
+                          <a:spcPts val="0"/>
+                        </a:spcBef>
+                        <a:spcAft>
+                          <a:spcPts val="0"/>
+                        </a:spcAft>
+                        <a:buNone/>
+                      </a:pPr>
+                      <a:endParaRPr sz="1800" dirty="0"/>
+                    </a:p>
+                  </a:txBody>
+                  <a:tcPr marL="91425" marR="91425" marT="91425" marB="91425"/>
+                </a:tc>
+                <a:extLst>
+                  <a:ext uri="{0D108BD9-81ED-4DB2-BD59-A6C34878D82A}">
+                    <a16:rowId xmlns:a16="http://schemas.microsoft.com/office/drawing/2014/main" val="10001"/>
+                  </a:ext>
+                </a:extLst>
+              </a:tr>
+            </a:tbl>
+          </a:graphicData>
+        </a:graphic>
+      </p:graphicFrame>
+    </p:spTree>
+    <p:extLst>
+      <p:ext uri="{BB962C8B-B14F-4D97-AF65-F5344CB8AC3E}">
+        <p14:creationId xmlns:p14="http://schemas.microsoft.com/office/powerpoint/2010/main" val="2337919152"/>
+      </p:ext>
+    </p:extLst>
+  </p:cSld>
+  <p:clrMapOvr>
+    <a:masterClrMapping/>
+  </p:clrMapOvr>
+</p:sld>
+</file>
+
+<file path=ppt/slides/slide37.xml><?xml version="1.0" encoding="utf-8"?>
+<p:sld xmlns:a="http://schemas.openxmlformats.org/drawingml/2006/main" xmlns:r="http://schemas.openxmlformats.org/officeDocument/2006/relationships" xmlns:p="http://schemas.openxmlformats.org/presentationml/2006/main">
+  <p:cSld>
+    <p:spTree>
+      <p:nvGrpSpPr>
+        <p:cNvPr id="1" name="Shape 77"/>
+        <p:cNvGrpSpPr/>
+        <p:nvPr/>
+      </p:nvGrpSpPr>
+      <p:grpSpPr>
+        <a:xfrm>
+          <a:off x="0" y="0"/>
+          <a:ext cx="0" cy="0"/>
+          <a:chOff x="0" y="0"/>
+          <a:chExt cx="0" cy="0"/>
+        </a:xfrm>
+      </p:grpSpPr>
+      <p:sp>
+        <p:nvSpPr>
+          <p:cNvPr id="78" name="Google Shape;78;p17"/>
+          <p:cNvSpPr txBox="1">
+            <a:spLocks noGrp="1"/>
+          </p:cNvSpPr>
+          <p:nvPr>
+            <p:ph type="title"/>
+          </p:nvPr>
+        </p:nvSpPr>
+        <p:spPr>
+          <a:xfrm>
+            <a:off x="311700" y="445025"/>
+            <a:ext cx="8520600" cy="572700"/>
+          </a:xfrm>
+          <a:prstGeom prst="rect">
+            <a:avLst/>
+          </a:prstGeom>
+        </p:spPr>
+        <p:txBody>
+          <a:bodyPr spcFirstLastPara="1" wrap="square" lIns="91425" tIns="91425" rIns="91425" bIns="91425" anchor="t" anchorCtr="0">
+            <a:noAutofit/>
+          </a:bodyPr>
+          <a:lstStyle/>
+          <a:p>
+            <a:pPr marL="0" lvl="0" indent="0" algn="l" rtl="0">
+              <a:spcBef>
+                <a:spcPts val="0"/>
+              </a:spcBef>
+              <a:spcAft>
+                <a:spcPts val="0"/>
+              </a:spcAft>
+              <a:buNone/>
+            </a:pPr>
+            <a:r>
+              <a:rPr lang="en" dirty="0"/>
+              <a:t>Component  v - Test Plan (and screenshot)</a:t>
+            </a:r>
+            <a:endParaRPr dirty="0"/>
+          </a:p>
+        </p:txBody>
+      </p:sp>
+      <p:graphicFrame>
+        <p:nvGraphicFramePr>
+          <p:cNvPr id="79" name="Google Shape;79;p17"/>
+          <p:cNvGraphicFramePr/>
+          <p:nvPr/>
+        </p:nvGraphicFramePr>
+        <p:xfrm>
+          <a:off x="311700" y="3794967"/>
+          <a:ext cx="8520600" cy="1188660"/>
+        </p:xfrm>
+        <a:graphic>
+          <a:graphicData uri="http://schemas.openxmlformats.org/drawingml/2006/table">
+            <a:tbl>
+              <a:tblPr>
+                <a:noFill/>
+                <a:tableStyleId>{E1099E06-0E6B-448D-9D27-60429F06E6F4}</a:tableStyleId>
+              </a:tblPr>
+              <a:tblGrid>
+                <a:gridCol w="2709796">
+                  <a:extLst>
+                    <a:ext uri="{9D8B030D-6E8A-4147-A177-3AD203B41FA5}">
+                      <a16:colId xmlns:a16="http://schemas.microsoft.com/office/drawing/2014/main" val="20000"/>
+                    </a:ext>
+                  </a:extLst>
+                </a:gridCol>
+                <a:gridCol w="5810804">
+                  <a:extLst>
+                    <a:ext uri="{9D8B030D-6E8A-4147-A177-3AD203B41FA5}">
+                      <a16:colId xmlns:a16="http://schemas.microsoft.com/office/drawing/2014/main" val="20001"/>
+                    </a:ext>
+                  </a:extLst>
+                </a:gridCol>
+              </a:tblGrid>
+              <a:tr h="381000">
+                <a:tc>
+                  <a:txBody>
+                    <a:bodyPr/>
+                    <a:lstStyle/>
+                    <a:p>
+                      <a:pPr marL="0" lvl="0" indent="0" algn="l" rtl="0">
+                        <a:spcBef>
+                          <a:spcPts val="0"/>
+                        </a:spcBef>
+                        <a:spcAft>
+                          <a:spcPts val="0"/>
+                        </a:spcAft>
+                        <a:buNone/>
+                      </a:pPr>
+                      <a:r>
+                        <a:rPr lang="en" sz="1800" b="1" dirty="0"/>
+                        <a:t>Test Case</a:t>
+                      </a:r>
+                      <a:endParaRPr sz="1800" b="1" dirty="0"/>
+                    </a:p>
+                  </a:txBody>
+                  <a:tcPr marL="91425" marR="91425" marT="91425" marB="91425">
+                    <a:solidFill>
+                      <a:srgbClr val="CCCCCC"/>
+                    </a:solidFill>
+                  </a:tcPr>
+                </a:tc>
+                <a:tc>
+                  <a:txBody>
+                    <a:bodyPr/>
+                    <a:lstStyle/>
+                    <a:p>
+                      <a:pPr marL="0" lvl="0" indent="0" algn="l" rtl="0">
+                        <a:spcBef>
+                          <a:spcPts val="0"/>
+                        </a:spcBef>
+                        <a:spcAft>
+                          <a:spcPts val="0"/>
+                        </a:spcAft>
+                        <a:buNone/>
+                      </a:pPr>
+                      <a:r>
+                        <a:rPr lang="en" sz="1800" b="1" dirty="0"/>
+                        <a:t>Expected Values</a:t>
+                      </a:r>
+                      <a:endParaRPr sz="1800" b="1" dirty="0"/>
+                    </a:p>
+                  </a:txBody>
+                  <a:tcPr marL="91425" marR="91425" marT="91425" marB="91425">
+                    <a:solidFill>
+                      <a:srgbClr val="CCCCCC"/>
+                    </a:solidFill>
+                  </a:tcPr>
+                </a:tc>
+                <a:extLst>
+                  <a:ext uri="{0D108BD9-81ED-4DB2-BD59-A6C34878D82A}">
+                    <a16:rowId xmlns:a16="http://schemas.microsoft.com/office/drawing/2014/main" val="10000"/>
+                  </a:ext>
+                </a:extLst>
+              </a:tr>
+              <a:tr h="396200">
+                <a:tc>
+                  <a:txBody>
+                    <a:bodyPr/>
+                    <a:lstStyle/>
+                    <a:p>
+                      <a:pPr marL="0" marR="0" lvl="0" indent="0" algn="l" defTabSz="914400" rtl="0" eaLnBrk="1" fontAlgn="auto" latinLnBrk="0" hangingPunct="1">
+                        <a:lnSpc>
+                          <a:spcPct val="100000"/>
+                        </a:lnSpc>
+                        <a:spcBef>
+                          <a:spcPts val="0"/>
+                        </a:spcBef>
+                        <a:spcAft>
+                          <a:spcPts val="0"/>
+                        </a:spcAft>
+                        <a:buClr>
+                          <a:srgbClr val="000000"/>
+                        </a:buClr>
+                        <a:buSzTx/>
+                        <a:buFont typeface="Arial"/>
+                        <a:buNone/>
+                        <a:tabLst/>
+                        <a:defRPr/>
+                      </a:pPr>
+                      <a:endParaRPr lang="en-US" sz="1800" dirty="0"/>
+                    </a:p>
+                    <a:p>
+                      <a:pPr marL="0" lvl="0" indent="0" algn="l" rtl="0">
+                        <a:spcBef>
+                          <a:spcPts val="0"/>
+                        </a:spcBef>
+                        <a:spcAft>
+                          <a:spcPts val="0"/>
+                        </a:spcAft>
+                        <a:buNone/>
+                      </a:pPr>
+                      <a:endParaRPr sz="1800" dirty="0"/>
+                    </a:p>
+                  </a:txBody>
+                  <a:tcPr marL="91425" marR="91425" marT="91425" marB="91425"/>
+                </a:tc>
+                <a:tc>
+                  <a:txBody>
+                    <a:bodyPr/>
+                    <a:lstStyle/>
+                    <a:p>
+                      <a:pPr marL="0" lvl="0" indent="0" algn="l" rtl="0">
+                        <a:spcBef>
+                          <a:spcPts val="0"/>
+                        </a:spcBef>
+                        <a:spcAft>
+                          <a:spcPts val="0"/>
+                        </a:spcAft>
+                        <a:buNone/>
+                      </a:pPr>
+                      <a:endParaRPr sz="1800" dirty="0"/>
+                    </a:p>
+                  </a:txBody>
+                  <a:tcPr marL="91425" marR="91425" marT="91425" marB="91425"/>
+                </a:tc>
+                <a:extLst>
+                  <a:ext uri="{0D108BD9-81ED-4DB2-BD59-A6C34878D82A}">
+                    <a16:rowId xmlns:a16="http://schemas.microsoft.com/office/drawing/2014/main" val="10001"/>
+                  </a:ext>
+                </a:extLst>
+              </a:tr>
+            </a:tbl>
+          </a:graphicData>
+        </a:graphic>
+      </p:graphicFrame>
+    </p:spTree>
+    <p:extLst>
+      <p:ext uri="{BB962C8B-B14F-4D97-AF65-F5344CB8AC3E}">
+        <p14:creationId xmlns:p14="http://schemas.microsoft.com/office/powerpoint/2010/main" val="1700163231"/>
+      </p:ext>
+    </p:extLst>
+  </p:cSld>
+  <p:clrMapOvr>
+    <a:masterClrMapping/>
+  </p:clrMapOvr>
+</p:sld>
+</file>
+
+<file path=ppt/slides/slide38.xml><?xml version="1.0" encoding="utf-8"?>
+<p:sld xmlns:a="http://schemas.openxmlformats.org/drawingml/2006/main" xmlns:r="http://schemas.openxmlformats.org/officeDocument/2006/relationships" xmlns:p="http://schemas.openxmlformats.org/presentationml/2006/main">
+  <p:cSld>
+    <p:spTree>
+      <p:nvGrpSpPr>
+        <p:cNvPr id="1" name="Shape 77"/>
+        <p:cNvGrpSpPr/>
+        <p:nvPr/>
+      </p:nvGrpSpPr>
+      <p:grpSpPr>
+        <a:xfrm>
+          <a:off x="0" y="0"/>
+          <a:ext cx="0" cy="0"/>
+          <a:chOff x="0" y="0"/>
+          <a:chExt cx="0" cy="0"/>
+        </a:xfrm>
+      </p:grpSpPr>
+      <p:sp>
+        <p:nvSpPr>
+          <p:cNvPr id="78" name="Google Shape;78;p17"/>
+          <p:cNvSpPr txBox="1">
+            <a:spLocks noGrp="1"/>
+          </p:cNvSpPr>
+          <p:nvPr>
+            <p:ph type="title"/>
+          </p:nvPr>
+        </p:nvSpPr>
+        <p:spPr>
+          <a:xfrm>
+            <a:off x="311700" y="445025"/>
+            <a:ext cx="8520600" cy="572700"/>
+          </a:xfrm>
+          <a:prstGeom prst="rect">
+            <a:avLst/>
+          </a:prstGeom>
+        </p:spPr>
+        <p:txBody>
+          <a:bodyPr spcFirstLastPara="1" wrap="square" lIns="91425" tIns="91425" rIns="91425" bIns="91425" anchor="t" anchorCtr="0">
+            <a:noAutofit/>
+          </a:bodyPr>
+          <a:lstStyle/>
+          <a:p>
+            <a:pPr marL="0" lvl="0" indent="0" algn="l" rtl="0">
+              <a:spcBef>
+                <a:spcPts val="0"/>
+              </a:spcBef>
+              <a:spcAft>
+                <a:spcPts val="0"/>
+              </a:spcAft>
+              <a:buNone/>
+            </a:pPr>
+            <a:r>
+              <a:rPr lang="en" dirty="0"/>
+              <a:t>Component  v - Test Plan (and screenshot)</a:t>
+            </a:r>
+            <a:endParaRPr dirty="0"/>
+          </a:p>
+        </p:txBody>
+      </p:sp>
+      <p:graphicFrame>
+        <p:nvGraphicFramePr>
+          <p:cNvPr id="79" name="Google Shape;79;p17"/>
+          <p:cNvGraphicFramePr/>
+          <p:nvPr/>
+        </p:nvGraphicFramePr>
+        <p:xfrm>
+          <a:off x="311700" y="3794967"/>
+          <a:ext cx="8520600" cy="1188660"/>
+        </p:xfrm>
+        <a:graphic>
+          <a:graphicData uri="http://schemas.openxmlformats.org/drawingml/2006/table">
+            <a:tbl>
+              <a:tblPr>
+                <a:noFill/>
+                <a:tableStyleId>{E1099E06-0E6B-448D-9D27-60429F06E6F4}</a:tableStyleId>
+              </a:tblPr>
+              <a:tblGrid>
+                <a:gridCol w="2709796">
+                  <a:extLst>
+                    <a:ext uri="{9D8B030D-6E8A-4147-A177-3AD203B41FA5}">
+                      <a16:colId xmlns:a16="http://schemas.microsoft.com/office/drawing/2014/main" val="20000"/>
+                    </a:ext>
+                  </a:extLst>
+                </a:gridCol>
+                <a:gridCol w="5810804">
+                  <a:extLst>
+                    <a:ext uri="{9D8B030D-6E8A-4147-A177-3AD203B41FA5}">
+                      <a16:colId xmlns:a16="http://schemas.microsoft.com/office/drawing/2014/main" val="20001"/>
+                    </a:ext>
+                  </a:extLst>
+                </a:gridCol>
+              </a:tblGrid>
+              <a:tr h="381000">
+                <a:tc>
+                  <a:txBody>
+                    <a:bodyPr/>
+                    <a:lstStyle/>
+                    <a:p>
+                      <a:pPr marL="0" lvl="0" indent="0" algn="l" rtl="0">
+                        <a:spcBef>
+                          <a:spcPts val="0"/>
+                        </a:spcBef>
+                        <a:spcAft>
+                          <a:spcPts val="0"/>
+                        </a:spcAft>
+                        <a:buNone/>
+                      </a:pPr>
+                      <a:r>
+                        <a:rPr lang="en" sz="1800" b="1" dirty="0"/>
+                        <a:t>Test Case</a:t>
+                      </a:r>
+                      <a:endParaRPr sz="1800" b="1" dirty="0"/>
+                    </a:p>
+                  </a:txBody>
+                  <a:tcPr marL="91425" marR="91425" marT="91425" marB="91425">
+                    <a:solidFill>
+                      <a:srgbClr val="CCCCCC"/>
+                    </a:solidFill>
+                  </a:tcPr>
+                </a:tc>
+                <a:tc>
+                  <a:txBody>
+                    <a:bodyPr/>
+                    <a:lstStyle/>
+                    <a:p>
+                      <a:pPr marL="0" lvl="0" indent="0" algn="l" rtl="0">
+                        <a:spcBef>
+                          <a:spcPts val="0"/>
+                        </a:spcBef>
+                        <a:spcAft>
+                          <a:spcPts val="0"/>
+                        </a:spcAft>
+                        <a:buNone/>
+                      </a:pPr>
+                      <a:r>
+                        <a:rPr lang="en" sz="1800" b="1" dirty="0"/>
+                        <a:t>Expected Values</a:t>
+                      </a:r>
+                      <a:endParaRPr sz="1800" b="1" dirty="0"/>
+                    </a:p>
+                  </a:txBody>
+                  <a:tcPr marL="91425" marR="91425" marT="91425" marB="91425">
+                    <a:solidFill>
+                      <a:srgbClr val="CCCCCC"/>
+                    </a:solidFill>
+                  </a:tcPr>
+                </a:tc>
+                <a:extLst>
+                  <a:ext uri="{0D108BD9-81ED-4DB2-BD59-A6C34878D82A}">
+                    <a16:rowId xmlns:a16="http://schemas.microsoft.com/office/drawing/2014/main" val="10000"/>
+                  </a:ext>
+                </a:extLst>
+              </a:tr>
+              <a:tr h="396200">
+                <a:tc>
+                  <a:txBody>
+                    <a:bodyPr/>
+                    <a:lstStyle/>
+                    <a:p>
+                      <a:pPr marL="0" marR="0" lvl="0" indent="0" algn="l" defTabSz="914400" rtl="0" eaLnBrk="1" fontAlgn="auto" latinLnBrk="0" hangingPunct="1">
+                        <a:lnSpc>
+                          <a:spcPct val="100000"/>
+                        </a:lnSpc>
+                        <a:spcBef>
+                          <a:spcPts val="0"/>
+                        </a:spcBef>
+                        <a:spcAft>
+                          <a:spcPts val="0"/>
+                        </a:spcAft>
+                        <a:buClr>
+                          <a:srgbClr val="000000"/>
+                        </a:buClr>
+                        <a:buSzTx/>
+                        <a:buFont typeface="Arial"/>
+                        <a:buNone/>
+                        <a:tabLst/>
+                        <a:defRPr/>
+                      </a:pPr>
+                      <a:endParaRPr lang="en-US" sz="1800" dirty="0"/>
+                    </a:p>
+                    <a:p>
+                      <a:pPr marL="0" lvl="0" indent="0" algn="l" rtl="0">
+                        <a:spcBef>
+                          <a:spcPts val="0"/>
+                        </a:spcBef>
+                        <a:spcAft>
+                          <a:spcPts val="0"/>
+                        </a:spcAft>
+                        <a:buNone/>
+                      </a:pPr>
+                      <a:endParaRPr sz="1800" dirty="0"/>
+                    </a:p>
+                  </a:txBody>
+                  <a:tcPr marL="91425" marR="91425" marT="91425" marB="91425"/>
+                </a:tc>
+                <a:tc>
+                  <a:txBody>
+                    <a:bodyPr/>
+                    <a:lstStyle/>
+                    <a:p>
+                      <a:pPr marL="0" lvl="0" indent="0" algn="l" rtl="0">
+                        <a:spcBef>
+                          <a:spcPts val="0"/>
+                        </a:spcBef>
+                        <a:spcAft>
+                          <a:spcPts val="0"/>
+                        </a:spcAft>
+                        <a:buNone/>
+                      </a:pPr>
+                      <a:endParaRPr sz="1800" dirty="0"/>
+                    </a:p>
+                  </a:txBody>
+                  <a:tcPr marL="91425" marR="91425" marT="91425" marB="91425"/>
+                </a:tc>
+                <a:extLst>
+                  <a:ext uri="{0D108BD9-81ED-4DB2-BD59-A6C34878D82A}">
+                    <a16:rowId xmlns:a16="http://schemas.microsoft.com/office/drawing/2014/main" val="10001"/>
+                  </a:ext>
+                </a:extLst>
+              </a:tr>
+            </a:tbl>
+          </a:graphicData>
+        </a:graphic>
+      </p:graphicFrame>
+    </p:spTree>
+    <p:extLst>
+      <p:ext uri="{BB962C8B-B14F-4D97-AF65-F5344CB8AC3E}">
+        <p14:creationId xmlns:p14="http://schemas.microsoft.com/office/powerpoint/2010/main" val="3398702849"/>
+      </p:ext>
+    </p:extLst>
+  </p:cSld>
+  <p:clrMapOvr>
+    <a:masterClrMapping/>
+  </p:clrMapOvr>
+</p:sld>
+</file>
+
+<file path=ppt/slides/slide39.xml><?xml version="1.0" encoding="utf-8"?>
 <p:sld xmlns:a="http://schemas.openxmlformats.org/drawingml/2006/main" xmlns:r="http://schemas.openxmlformats.org/officeDocument/2006/relationships" xmlns:p="http://schemas.openxmlformats.org/presentationml/2006/main">
   <p:cSld>
     <p:bg>
@@ -17940,85 +19862,6 @@
               <a:t>Your version control evidence should go here.  This could be in the form of annotated screenshots which show you you managed this process or you could make a brief screencast explaining how you implemented version control.</a:t>
             </a:r>
             <a:endParaRPr i="1"/>
-          </a:p>
-        </p:txBody>
-      </p:sp>
-    </p:spTree>
-  </p:cSld>
-  <p:clrMapOvr>
-    <a:masterClrMapping/>
-  </p:clrMapOvr>
-</p:sld>
-</file>
-
-<file path=ppt/slides/slide35.xml><?xml version="1.0" encoding="utf-8"?>
-<p:sld xmlns:a="http://schemas.openxmlformats.org/drawingml/2006/main" xmlns:r="http://schemas.openxmlformats.org/officeDocument/2006/relationships" xmlns:p="http://schemas.openxmlformats.org/presentationml/2006/main">
-  <p:cSld>
-    <p:bg>
-      <p:bgPr>
-        <a:solidFill>
-          <a:srgbClr val="FFE599"/>
-        </a:solidFill>
-        <a:effectLst/>
-      </p:bgPr>
-    </p:bg>
-    <p:spTree>
-      <p:nvGrpSpPr>
-        <p:cNvPr id="1" name="Shape 89"/>
-        <p:cNvGrpSpPr/>
-        <p:nvPr/>
-      </p:nvGrpSpPr>
-      <p:grpSpPr>
-        <a:xfrm>
-          <a:off x="0" y="0"/>
-          <a:ext cx="0" cy="0"/>
-          <a:chOff x="0" y="0"/>
-          <a:chExt cx="0" cy="0"/>
-        </a:xfrm>
-      </p:grpSpPr>
-      <p:sp>
-        <p:nvSpPr>
-          <p:cNvPr id="90" name="Google Shape;90;p19"/>
-          <p:cNvSpPr txBox="1">
-            <a:spLocks noGrp="1"/>
-          </p:cNvSpPr>
-          <p:nvPr>
-            <p:ph type="body" idx="1"/>
-          </p:nvPr>
-        </p:nvSpPr>
-        <p:spPr>
-          <a:xfrm>
-            <a:off x="311700" y="397700"/>
-            <a:ext cx="8520600" cy="4171200"/>
-          </a:xfrm>
-          <a:prstGeom prst="rect">
-            <a:avLst/>
-          </a:prstGeom>
-        </p:spPr>
-        <p:txBody>
-          <a:bodyPr spcFirstLastPara="1" wrap="square" lIns="91425" tIns="91425" rIns="91425" bIns="91425" anchor="t" anchorCtr="0">
-            <a:noAutofit/>
-          </a:bodyPr>
-          <a:lstStyle/>
-          <a:p>
-            <a:pPr marL="0" lvl="0" indent="0" algn="l" rtl="0">
-              <a:spcBef>
-                <a:spcPts val="0"/>
-              </a:spcBef>
-              <a:spcAft>
-                <a:spcPts val="1600"/>
-              </a:spcAft>
-              <a:buNone/>
-            </a:pPr>
-            <a:r>
-              <a:rPr lang="en" b="1" i="1">
-                <a:solidFill>
-                  <a:srgbClr val="595959"/>
-                </a:solidFill>
-              </a:rPr>
-              <a:t>Discusses how the information from planning, testing and trialling of components assisted in the development of a high-quality outcome</a:t>
-            </a:r>
-            <a:endParaRPr/>
           </a:p>
         </p:txBody>
       </p:sp>
@@ -18157,6 +20000,85 @@
           </a:prstGeom>
         </p:spPr>
       </p:pic>
+    </p:spTree>
+  </p:cSld>
+  <p:clrMapOvr>
+    <a:masterClrMapping/>
+  </p:clrMapOvr>
+</p:sld>
+</file>
+
+<file path=ppt/slides/slide40.xml><?xml version="1.0" encoding="utf-8"?>
+<p:sld xmlns:a="http://schemas.openxmlformats.org/drawingml/2006/main" xmlns:r="http://schemas.openxmlformats.org/officeDocument/2006/relationships" xmlns:p="http://schemas.openxmlformats.org/presentationml/2006/main">
+  <p:cSld>
+    <p:bg>
+      <p:bgPr>
+        <a:solidFill>
+          <a:srgbClr val="FFE599"/>
+        </a:solidFill>
+        <a:effectLst/>
+      </p:bgPr>
+    </p:bg>
+    <p:spTree>
+      <p:nvGrpSpPr>
+        <p:cNvPr id="1" name="Shape 89"/>
+        <p:cNvGrpSpPr/>
+        <p:nvPr/>
+      </p:nvGrpSpPr>
+      <p:grpSpPr>
+        <a:xfrm>
+          <a:off x="0" y="0"/>
+          <a:ext cx="0" cy="0"/>
+          <a:chOff x="0" y="0"/>
+          <a:chExt cx="0" cy="0"/>
+        </a:xfrm>
+      </p:grpSpPr>
+      <p:sp>
+        <p:nvSpPr>
+          <p:cNvPr id="90" name="Google Shape;90;p19"/>
+          <p:cNvSpPr txBox="1">
+            <a:spLocks noGrp="1"/>
+          </p:cNvSpPr>
+          <p:nvPr>
+            <p:ph type="body" idx="1"/>
+          </p:nvPr>
+        </p:nvSpPr>
+        <p:spPr>
+          <a:xfrm>
+            <a:off x="311700" y="397700"/>
+            <a:ext cx="8520600" cy="4171200"/>
+          </a:xfrm>
+          <a:prstGeom prst="rect">
+            <a:avLst/>
+          </a:prstGeom>
+        </p:spPr>
+        <p:txBody>
+          <a:bodyPr spcFirstLastPara="1" wrap="square" lIns="91425" tIns="91425" rIns="91425" bIns="91425" anchor="t" anchorCtr="0">
+            <a:noAutofit/>
+          </a:bodyPr>
+          <a:lstStyle/>
+          <a:p>
+            <a:pPr marL="0" lvl="0" indent="0" algn="l" rtl="0">
+              <a:spcBef>
+                <a:spcPts val="0"/>
+              </a:spcBef>
+              <a:spcAft>
+                <a:spcPts val="1600"/>
+              </a:spcAft>
+              <a:buNone/>
+            </a:pPr>
+            <a:r>
+              <a:rPr lang="en" b="1" i="1">
+                <a:solidFill>
+                  <a:srgbClr val="595959"/>
+                </a:solidFill>
+              </a:rPr>
+              <a:t>Discusses how the information from planning, testing and trialling of components assisted in the development of a high-quality outcome</a:t>
+            </a:r>
+            <a:endParaRPr/>
+          </a:p>
+        </p:txBody>
+      </p:sp>
     </p:spTree>
   </p:cSld>
   <p:clrMapOvr>

</xml_diff>